<commit_message>
final comit before submitting thesis
</commit_message>
<xml_diff>
--- a/Thesis/TFM_LukaszHarazin_Presentacion.pptx
+++ b/Thesis/TFM_LukaszHarazin_Presentacion.pptx
@@ -5,10 +5,10 @@
     <p:sldMasterId id="2147483648" r:id="rId4"/>
   </p:sldMasterIdLst>
   <p:notesMasterIdLst>
-    <p:notesMasterId r:id="rId25"/>
+    <p:notesMasterId r:id="rId26"/>
   </p:notesMasterIdLst>
   <p:handoutMasterIdLst>
-    <p:handoutMasterId r:id="rId26"/>
+    <p:handoutMasterId r:id="rId27"/>
   </p:handoutMasterIdLst>
   <p:sldIdLst>
     <p:sldId id="282" r:id="rId5"/>
@@ -20,17 +20,18 @@
     <p:sldId id="307" r:id="rId11"/>
     <p:sldId id="308" r:id="rId12"/>
     <p:sldId id="291" r:id="rId13"/>
-    <p:sldId id="295" r:id="rId14"/>
-    <p:sldId id="296" r:id="rId15"/>
-    <p:sldId id="297" r:id="rId16"/>
-    <p:sldId id="298" r:id="rId17"/>
+    <p:sldId id="296" r:id="rId14"/>
+    <p:sldId id="297" r:id="rId15"/>
+    <p:sldId id="298" r:id="rId16"/>
+    <p:sldId id="309" r:id="rId17"/>
     <p:sldId id="299" r:id="rId18"/>
     <p:sldId id="300" r:id="rId19"/>
     <p:sldId id="301" r:id="rId20"/>
     <p:sldId id="302" r:id="rId21"/>
     <p:sldId id="303" r:id="rId22"/>
-    <p:sldId id="304" r:id="rId23"/>
-    <p:sldId id="305" r:id="rId24"/>
+    <p:sldId id="295" r:id="rId23"/>
+    <p:sldId id="304" r:id="rId24"/>
+    <p:sldId id="305" r:id="rId25"/>
   </p:sldIdLst>
   <p:sldSz cx="12192000" cy="6858000"/>
   <p:notesSz cx="6858000" cy="9144000"/>
@@ -140,6 +141,75 @@
 </p:presentation>
 </file>
 
+<file path=ppt/revisionInfo.xml><?xml version="1.0" encoding="utf-8"?>
+<p1510:revInfo xmlns:a="http://schemas.openxmlformats.org/drawingml/2006/main" xmlns:r="http://schemas.openxmlformats.org/officeDocument/2006/relationships" xmlns:p1510="http://schemas.microsoft.com/office/powerpoint/2015/10/main">
+  <p1510:revLst>
+    <p1510:client id="{5CDC166E-5E1B-4F12-B673-671F65DC4E06}" v="6" dt="2024-06-28T18:30:02.367"/>
+  </p1510:revLst>
+</p1510:revInfo>
+</file>
+
+<file path=ppt/changesInfos/changesInfo1.xml><?xml version="1.0" encoding="utf-8"?>
+<pc:chgInfo xmlns:a="http://schemas.openxmlformats.org/drawingml/2006/main" xmlns:r="http://schemas.openxmlformats.org/officeDocument/2006/relationships" xmlns:ac="http://schemas.microsoft.com/office/drawing/2013/main/command" xmlns:pc="http://schemas.microsoft.com/office/powerpoint/2013/main/command">
+  <pc:docChgLst>
+    <pc:chgData name="Lucas Harazin" userId="0bebc8272bf3707b" providerId="LiveId" clId="{5CDC166E-5E1B-4F12-B673-671F65DC4E06}"/>
+    <pc:docChg chg="custSel addSld modSld sldOrd">
+      <pc:chgData name="Lucas Harazin" userId="0bebc8272bf3707b" providerId="LiveId" clId="{5CDC166E-5E1B-4F12-B673-671F65DC4E06}" dt="2024-06-28T18:30:02.367" v="88"/>
+      <pc:docMkLst>
+        <pc:docMk/>
+      </pc:docMkLst>
+      <pc:sldChg chg="addSp delSp modSp add mod ord modAnim">
+        <pc:chgData name="Lucas Harazin" userId="0bebc8272bf3707b" providerId="LiveId" clId="{5CDC166E-5E1B-4F12-B673-671F65DC4E06}" dt="2024-06-28T18:30:02.367" v="88"/>
+        <pc:sldMkLst>
+          <pc:docMk/>
+          <pc:sldMk cId="2442479917" sldId="309"/>
+        </pc:sldMkLst>
+        <pc:spChg chg="mod">
+          <ac:chgData name="Lucas Harazin" userId="0bebc8272bf3707b" providerId="LiveId" clId="{5CDC166E-5E1B-4F12-B673-671F65DC4E06}" dt="2024-06-28T18:27:31.688" v="31" actId="20577"/>
+          <ac:spMkLst>
+            <pc:docMk/>
+            <pc:sldMk cId="2442479917" sldId="309"/>
+            <ac:spMk id="2" creationId="{3560F281-4FF6-4617-A809-AC9C15ECF18A}"/>
+          </ac:spMkLst>
+        </pc:spChg>
+        <pc:spChg chg="mod">
+          <ac:chgData name="Lucas Harazin" userId="0bebc8272bf3707b" providerId="LiveId" clId="{5CDC166E-5E1B-4F12-B673-671F65DC4E06}" dt="2024-06-28T18:29:34.901" v="81" actId="20577"/>
+          <ac:spMkLst>
+            <pc:docMk/>
+            <pc:sldMk cId="2442479917" sldId="309"/>
+            <ac:spMk id="4" creationId="{D355C61F-C8F1-4977-8E1F-F16C0D9EA88C}"/>
+          </ac:spMkLst>
+        </pc:spChg>
+        <pc:picChg chg="del">
+          <ac:chgData name="Lucas Harazin" userId="0bebc8272bf3707b" providerId="LiveId" clId="{5CDC166E-5E1B-4F12-B673-671F65DC4E06}" dt="2024-06-28T18:28:46.063" v="68" actId="478"/>
+          <ac:picMkLst>
+            <pc:docMk/>
+            <pc:sldMk cId="2442479917" sldId="309"/>
+            <ac:picMk id="7" creationId="{00003010-A04C-1830-262C-EBF04C701975}"/>
+          </ac:picMkLst>
+        </pc:picChg>
+        <pc:picChg chg="add mod">
+          <ac:chgData name="Lucas Harazin" userId="0bebc8272bf3707b" providerId="LiveId" clId="{5CDC166E-5E1B-4F12-B673-671F65DC4E06}" dt="2024-06-28T18:28:57.117" v="70" actId="1076"/>
+          <ac:picMkLst>
+            <pc:docMk/>
+            <pc:sldMk cId="2442479917" sldId="309"/>
+            <ac:picMk id="8" creationId="{07728FC2-7E60-270E-09AB-68294F108C54}"/>
+          </ac:picMkLst>
+        </pc:picChg>
+        <pc:picChg chg="add mod">
+          <ac:chgData name="Lucas Harazin" userId="0bebc8272bf3707b" providerId="LiveId" clId="{5CDC166E-5E1B-4F12-B673-671F65DC4E06}" dt="2024-06-28T18:29:40.242" v="83" actId="1076"/>
+          <ac:picMkLst>
+            <pc:docMk/>
+            <pc:sldMk cId="2442479917" sldId="309"/>
+            <ac:picMk id="11" creationId="{B43C0003-6ABC-5A17-216E-DDB805E36544}"/>
+          </ac:picMkLst>
+        </pc:picChg>
+      </pc:sldChg>
+    </pc:docChg>
+  </pc:docChgLst>
+</pc:chgInfo>
+</file>
+
 <file path=ppt/handoutMasters/handoutMaster1.xml><?xml version="1.0" encoding="utf-8"?>
 <p:handoutMaster xmlns:a="http://schemas.openxmlformats.org/drawingml/2006/main" xmlns:r="http://schemas.openxmlformats.org/officeDocument/2006/relationships" xmlns:p="http://schemas.openxmlformats.org/presentationml/2006/main">
   <p:cSld>
@@ -236,7 +306,7 @@
             <a:pPr rtl="0"/>
             <a:fld id="{615FAA28-D333-4D57-AF0E-BDF53B4498B2}" type="datetime1">
               <a:rPr lang="en-GB" smtClean="0"/>
-              <a:t>21/06/2024</a:t>
+              <a:t>28/06/2024</a:t>
             </a:fld>
             <a:endParaRPr lang="en-GB" dirty="0"/>
           </a:p>
@@ -726,6 +796,34 @@
 </inkml:ink>
 </file>
 
+<file path=ppt/ink/ink22.xml><?xml version="1.0" encoding="utf-8"?>
+<inkml:ink xmlns:inkml="http://www.w3.org/2003/InkML">
+  <inkml:definitions>
+    <inkml:context xml:id="ctx0">
+      <inkml:inkSource xml:id="inkSrc0">
+        <inkml:traceFormat>
+          <inkml:channel name="X" type="integer" min="-2.14748E9" max="2.14748E9" units="cm"/>
+          <inkml:channel name="Y" type="integer" min="-2.14748E9" max="2.14748E9" units="cm"/>
+          <inkml:channel name="F" type="integer" max="32767" units="dev"/>
+        </inkml:traceFormat>
+        <inkml:channelProperties>
+          <inkml:channelProperty channel="X" name="resolution" value="1000" units="1/cm"/>
+          <inkml:channelProperty channel="Y" name="resolution" value="1000" units="1/cm"/>
+          <inkml:channelProperty channel="F" name="resolution" value="0" units="1/dev"/>
+        </inkml:channelProperties>
+      </inkml:inkSource>
+      <inkml:timestamp xml:id="ts0" timeString="2023-07-17T13:06:51.023"/>
+    </inkml:context>
+    <inkml:brush xml:id="br0">
+      <inkml:brushProperty name="width" value="0.35" units="cm"/>
+      <inkml:brushProperty name="height" value="0.35" units="cm"/>
+      <inkml:brushProperty name="color" value="#FFFFFF"/>
+    </inkml:brush>
+  </inkml:definitions>
+  <inkml:trace contextRef="#ctx0" brushRef="#br0">1487 451 24575,'433'-7'0,"-6"-37"0,-165-20 0,-230 56 0,21-10 0,0-2 0,56-31 0,-93 43 0,-8 3 0,0-1 0,-1 0 0,1 0 0,-1 0 0,-1-1 0,1 0 0,6-11 0,29-27 0,-39 43 0,-1 0 0,1 0 0,-1 0 0,1 0 0,0 0 0,0 1 0,0-1 0,0 1 0,0 0 0,0 0 0,0 0 0,1 1 0,-1-1 0,5 0 0,-7 2 0,0-1 0,1 0 0,-1 1 0,0-1 0,1 1 0,-1-1 0,0 1 0,0 0 0,1 0 0,-1-1 0,0 1 0,0 0 0,0 0 0,0 0 0,0 0 0,0 0 0,0 1 0,-1-1 0,1 0 0,0 0 0,-1 0 0,1 1 0,-1-1 0,1 0 0,-1 1 0,1-1 0,-1 1 0,0-1 0,0 0 0,0 1 0,0-1 0,0 3 0,0 54 0,-1-49 0,0 17 0,-1 0 0,0 1 0,2-1 0,2 1 0,8 51 0,0-16 0,-10-51 0,1-1 0,0 1 0,1-1 0,1 1 0,0-1 0,0 0 0,1 0 0,0 0 0,5 10 0,37 44 0,-30-43 0,-1 0 0,-1 1 0,-1 1 0,13 30 0,-25-51 0,-1-1 0,1 1 0,0 0 0,-1 0 0,1-1 0,-1 1 0,1 0 0,-1 0 0,0 0 0,0 0 0,0 0 0,0-1 0,0 1 0,0 0 0,0 0 0,-1 0 0,1 0 0,-1 0 0,1-1 0,-1 1 0,0 0 0,1-1 0,-1 1 0,0 0 0,0-1 0,0 1 0,-1-1 0,1 1 0,0-1 0,0 0 0,-1 1 0,1-1 0,-1 0 0,1 0 0,-1 0 0,0 0 0,1 0 0,-1-1 0,0 1 0,0 0 0,1-1 0,-1 1 0,0-1 0,-3 1 0,-11 1 0,0 0 0,0-2 0,0 1 0,-23-4 0,15 2 0,-183-25 0,-480 23 0,348 5 0,319-2 0,1-2 0,-1 0 0,1-2 0,0 0 0,0-1 0,1 0 0,-1-2 0,-17-9 0,34 15 0,0 0 0,1 1 0,-1-1 0,1 0 0,0-1 0,-1 1 0,1 0 0,0 0 0,0-1 0,0 1 0,0 0 0,0-1 0,0 1 0,0-1 0,0 1 0,0-1 0,1 0 0,-1 1 0,1-1 0,-1 0 0,1 0 0,-1 1 0,1-1 0,0 0 0,0 0 0,0 1 0,0-1 0,0 0 0,1 0 0,-1 1 0,1-1 0,-1 0 0,1 1 0,-1-1 0,1 0 0,0 1 0,1-4 0,4-5 0,0 0 0,1 0 0,0 1 0,11-12 0,-17 20 0,27-26 0,1 1 0,2 1 0,1 2 0,0 1 0,2 2 0,0 1 0,42-16 0,29-3 0,-73 28 0,52-23 0,-66 26 0,0 0 0,0 1 0,1 0 0,0 2 0,1 0 0,-1 1 0,26 0 0,139 8 0,-171-4 0,3 0 0,0 2 0,-1 0 0,1 1 0,-1 0 0,1 1 0,-1 1 0,-1 0 0,1 1 0,-1 1 0,19 14 0,-18-14 0,0-1 0,0 0 0,1-1 0,-1-1 0,24 4 0,-39-12 0,0 0 0,0 0 0,0 0 0,-1 0 0,0 0 0,1 0 0,-1-1 0,0 2 0,0-1 0,-1 0 0,1 0 0,-3-4 0,-5-15 0,0-14 0,-8-50 0,13 58 0,-1 1 0,-1 0 0,-1 0 0,-15-34 0,21 58 0,0 1 0,-1 0 0,0-1 0,1 1 0,-1 0 0,0 0 0,0 0 0,0 0 0,-1 0 0,1 0 0,0 1 0,-1-1 0,1 1 0,-1-1 0,1 1 0,-1 0 0,0 0 0,1 0 0,-1 1 0,0-1 0,0 1 0,0-1 0,-4 1 0,-9 0 0,1 0 0,0 2 0,-23 4 0,-7 1 0,-118-3 0,88-4 0,-101 13 0,81-3 0,0-5 0,-106-8 0,47 0 0,106 3 0,-74 1 0,-1-5 0,-123-21 0,93 5 0,-160 0 0,211 15 0,-45-11 0,86 8 0,7-1 0,39 6 0,0 0 0,0 1 0,-1 1 0,-15 0 0,26 2 0,-1 0 0,0 0 0,0 0 0,0 1 0,1 0 0,-1 0 0,1 0 0,-1 0 0,1 1 0,0 0 0,0 0 0,0 1 0,0 0 0,-4 4 0,7-6 0,-10 8 0,1 1 0,0 1 0,1 0 0,-11 17 0,20-28 0,0 0 0,0 1 0,0-1 0,0 1 0,0-1 0,0 1 0,0 0 0,0-1 0,1 1 0,-1 0 0,1-1 0,0 1 0,-1 0 0,1 0 0,0 0 0,0-1 0,0 1 0,0 0 0,0 0 0,0 0 0,1-1 0,-1 1 0,1 0 0,-1 0 0,1-1 0,-1 1 0,1 0 0,0-1 0,0 1 0,0-1 0,0 1 0,0-1 0,0 1 0,0-1 0,1 0 0,-1 0 0,1 0 0,-1 1 0,0-1 0,1 0 0,0-1 0,-1 1 0,1 0 0,-1 0 0,1-1 0,0 1 0,0-1 0,2 1 0,21 4 0,0-1 0,0-1 0,1-2 0,-1 0 0,50-6 0,-3 1 0,347-15 0,-321 7 0,128-7 0,-192 17 0,50-9 0,-63 7 0,0 0 0,-1 2 0,1 0 0,0 2 0,0 0 0,0 1 0,21 4 0,-39-4 0,-1-1 0,0 1 0,1-1 0,-1 1 0,0 0 0,1 0 0,-1 0 0,0 0 0,0 0 0,0 1 0,0-1 0,0 1 0,0-1 0,0 1 0,-1-1 0,3 4 0,-3-3 0,-1-1 0,1 0 0,-1 0 0,0 0 0,1 1 0,-1-1 0,0 0 0,0 0 0,0 1 0,0-1 0,0 0 0,0 0 0,-1 1 0,1-1 0,0 0 0,-1 0 0,1 0 0,-1 1 0,1-1 0,-1 0 0,1 0 0,-2 2 0,-3 2 0,0 1 0,0-1 0,0 0 0,0 0 0,-1 0 0,0-1 0,0 0 0,0 0 0,-9 4 0,-17 5 0,-1-1 0,-1-2 0,-45 8 0,-37 10 0,20-2 0,-119 17 0,87-20 0,101-19-1365</inkml:trace>
+</inkml:ink>
+</file>
+
 <file path=ppt/ink/ink3.xml><?xml version="1.0" encoding="utf-8"?>
 <inkml:ink xmlns:inkml="http://www.w3.org/2003/InkML">
   <inkml:definitions>
@@ -1006,7 +1104,7 @@
             <a:pPr rtl="0"/>
             <a:fld id="{6D03277C-3F5C-4673-8D79-1738A329ED93}" type="datetime1">
               <a:rPr lang="en-GB" noProof="0" smtClean="0"/>
-              <a:t>21/06/2024</a:t>
+              <a:t>28/06/2024</a:t>
             </a:fld>
             <a:endParaRPr lang="en-GB" noProof="0" dirty="0"/>
           </a:p>
@@ -1439,7 +1537,7 @@
     </p:spTree>
     <p:extLst>
       <p:ext uri="{BB962C8B-B14F-4D97-AF65-F5344CB8AC3E}">
-        <p14:creationId xmlns:p14="http://schemas.microsoft.com/office/powerpoint/2010/main" val="3532779386"/>
+        <p14:creationId xmlns:p14="http://schemas.microsoft.com/office/powerpoint/2010/main" val="610137213"/>
       </p:ext>
     </p:extLst>
   </p:cSld>
@@ -1525,7 +1623,7 @@
     </p:spTree>
     <p:extLst>
       <p:ext uri="{BB962C8B-B14F-4D97-AF65-F5344CB8AC3E}">
-        <p14:creationId xmlns:p14="http://schemas.microsoft.com/office/powerpoint/2010/main" val="610137213"/>
+        <p14:creationId xmlns:p14="http://schemas.microsoft.com/office/powerpoint/2010/main" val="1040771686"/>
       </p:ext>
     </p:extLst>
   </p:cSld>
@@ -1611,7 +1709,7 @@
     </p:spTree>
     <p:extLst>
       <p:ext uri="{BB962C8B-B14F-4D97-AF65-F5344CB8AC3E}">
-        <p14:creationId xmlns:p14="http://schemas.microsoft.com/office/powerpoint/2010/main" val="1040771686"/>
+        <p14:creationId xmlns:p14="http://schemas.microsoft.com/office/powerpoint/2010/main" val="3023987897"/>
       </p:ext>
     </p:extLst>
   </p:cSld>
@@ -1697,7 +1795,7 @@
     </p:spTree>
     <p:extLst>
       <p:ext uri="{BB962C8B-B14F-4D97-AF65-F5344CB8AC3E}">
-        <p14:creationId xmlns:p14="http://schemas.microsoft.com/office/powerpoint/2010/main" val="3023987897"/>
+        <p14:creationId xmlns:p14="http://schemas.microsoft.com/office/powerpoint/2010/main" val="1330913567"/>
       </p:ext>
     </p:extLst>
   </p:cSld>
@@ -2213,7 +2311,7 @@
     </p:spTree>
     <p:extLst>
       <p:ext uri="{BB962C8B-B14F-4D97-AF65-F5344CB8AC3E}">
-        <p14:creationId xmlns:p14="http://schemas.microsoft.com/office/powerpoint/2010/main" val="835412966"/>
+        <p14:creationId xmlns:p14="http://schemas.microsoft.com/office/powerpoint/2010/main" val="3532779386"/>
       </p:ext>
     </p:extLst>
   </p:cSld>
@@ -2377,6 +2475,92 @@
             <a:fld id="{8530193B-564F-4854-8A52-728F3FB19C85}" type="slidenum">
               <a:rPr lang="en-GB" smtClean="0"/>
               <a:t>20</a:t>
+            </a:fld>
+            <a:endParaRPr lang="en-GB" dirty="0"/>
+          </a:p>
+        </p:txBody>
+      </p:sp>
+    </p:spTree>
+    <p:extLst>
+      <p:ext uri="{BB962C8B-B14F-4D97-AF65-F5344CB8AC3E}">
+        <p14:creationId xmlns:p14="http://schemas.microsoft.com/office/powerpoint/2010/main" val="835412966"/>
+      </p:ext>
+    </p:extLst>
+  </p:cSld>
+  <p:clrMapOvr>
+    <a:masterClrMapping/>
+  </p:clrMapOvr>
+</p:notes>
+</file>
+
+<file path=ppt/notesSlides/notesSlide21.xml><?xml version="1.0" encoding="utf-8"?>
+<p:notes xmlns:a="http://schemas.openxmlformats.org/drawingml/2006/main" xmlns:r="http://schemas.openxmlformats.org/officeDocument/2006/relationships" xmlns:p="http://schemas.openxmlformats.org/presentationml/2006/main">
+  <p:cSld>
+    <p:spTree>
+      <p:nvGrpSpPr>
+        <p:cNvPr id="1" name=""/>
+        <p:cNvGrpSpPr/>
+        <p:nvPr/>
+      </p:nvGrpSpPr>
+      <p:grpSpPr>
+        <a:xfrm>
+          <a:off x="0" y="0"/>
+          <a:ext cx="0" cy="0"/>
+          <a:chOff x="0" y="0"/>
+          <a:chExt cx="0" cy="0"/>
+        </a:xfrm>
+      </p:grpSpPr>
+      <p:sp>
+        <p:nvSpPr>
+          <p:cNvPr id="2" name="Slide Image Placeholder 1"/>
+          <p:cNvSpPr>
+            <a:spLocks noGrp="1" noRot="1" noChangeAspect="1"/>
+          </p:cNvSpPr>
+          <p:nvPr>
+            <p:ph type="sldImg"/>
+          </p:nvPr>
+        </p:nvSpPr>
+        <p:spPr/>
+      </p:sp>
+      <p:sp>
+        <p:nvSpPr>
+          <p:cNvPr id="3" name="Notes Placeholder 2"/>
+          <p:cNvSpPr>
+            <a:spLocks noGrp="1"/>
+          </p:cNvSpPr>
+          <p:nvPr>
+            <p:ph type="body" idx="1"/>
+          </p:nvPr>
+        </p:nvSpPr>
+        <p:spPr/>
+        <p:txBody>
+          <a:bodyPr rtlCol="0"/>
+          <a:lstStyle/>
+          <a:p>
+            <a:pPr rtl="0"/>
+            <a:endParaRPr lang="en-GB" dirty="0"/>
+          </a:p>
+        </p:txBody>
+      </p:sp>
+      <p:sp>
+        <p:nvSpPr>
+          <p:cNvPr id="4" name="Slide Number Placeholder 3"/>
+          <p:cNvSpPr>
+            <a:spLocks noGrp="1"/>
+          </p:cNvSpPr>
+          <p:nvPr>
+            <p:ph type="sldNum" sz="quarter" idx="5"/>
+          </p:nvPr>
+        </p:nvSpPr>
+        <p:spPr/>
+        <p:txBody>
+          <a:bodyPr rtlCol="0"/>
+          <a:lstStyle/>
+          <a:p>
+            <a:pPr rtl="0"/>
+            <a:fld id="{8530193B-564F-4854-8A52-728F3FB19C85}" type="slidenum">
+              <a:rPr lang="en-GB" smtClean="0"/>
+              <a:t>21</a:t>
             </a:fld>
             <a:endParaRPr lang="en-GB" dirty="0"/>
           </a:p>
@@ -10921,293 +11105,6 @@
             <a:pPr algn="l" rtl="0"/>
             <a:r>
               <a:rPr lang="es-ES" dirty="0"/>
-              <a:t>Recogida de Datos</a:t>
-            </a:r>
-          </a:p>
-        </p:txBody>
-      </p:sp>
-      <p:sp>
-        <p:nvSpPr>
-          <p:cNvPr id="4" name="Content Placeholder 3">
-            <a:extLst>
-              <a:ext uri="{FF2B5EF4-FFF2-40B4-BE49-F238E27FC236}">
-                <a16:creationId xmlns:a16="http://schemas.microsoft.com/office/drawing/2014/main" id="{D355C61F-C8F1-4977-8E1F-F16C0D9EA88C}"/>
-              </a:ext>
-            </a:extLst>
-          </p:cNvPr>
-          <p:cNvSpPr>
-            <a:spLocks noGrp="1"/>
-          </p:cNvSpPr>
-          <p:nvPr>
-            <p:ph sz="half" idx="1"/>
-          </p:nvPr>
-        </p:nvSpPr>
-        <p:spPr>
-          <a:xfrm>
-            <a:off x="545946" y="1339731"/>
-            <a:ext cx="8323734" cy="5019166"/>
-          </a:xfrm>
-        </p:spPr>
-        <p:txBody>
-          <a:bodyPr rtlCol="0"/>
-          <a:lstStyle/>
-          <a:p>
-            <a:pPr marL="0" lvl="0" indent="0">
-              <a:lnSpc>
-                <a:spcPct val="107000"/>
-              </a:lnSpc>
-              <a:spcAft>
-                <a:spcPts val="800"/>
-              </a:spcAft>
-              <a:buNone/>
-            </a:pPr>
-            <a:r>
-              <a:rPr lang="es-ES" sz="1800" kern="100" dirty="0">
-                <a:effectLst/>
-                <a:latin typeface="Calibri" panose="020F0502020204030204" pitchFamily="34" charset="0"/>
-                <a:ea typeface="Calibri" panose="020F0502020204030204" pitchFamily="34" charset="0"/>
-                <a:cs typeface="Times New Roman" panose="02020603050405020304" pitchFamily="18" charset="0"/>
-              </a:rPr>
-              <a:t>Automatizado con seis funciones Lambda en la nube de Amazon.</a:t>
-            </a:r>
-            <a:endParaRPr lang="es-ES" kern="100" dirty="0">
-              <a:latin typeface="Calibri" panose="020F0502020204030204" pitchFamily="34" charset="0"/>
-              <a:ea typeface="Calibri" panose="020F0502020204030204" pitchFamily="34" charset="0"/>
-              <a:cs typeface="Times New Roman" panose="02020603050405020304" pitchFamily="18" charset="0"/>
-            </a:endParaRPr>
-          </a:p>
-          <a:p>
-            <a:pPr marL="0" lvl="0" indent="0">
-              <a:lnSpc>
-                <a:spcPct val="107000"/>
-              </a:lnSpc>
-              <a:spcAft>
-                <a:spcPts val="800"/>
-              </a:spcAft>
-              <a:buNone/>
-            </a:pPr>
-            <a:endParaRPr lang="es-ES" sz="1800" kern="100" dirty="0">
-              <a:effectLst/>
-              <a:latin typeface="Calibri" panose="020F0502020204030204" pitchFamily="34" charset="0"/>
-              <a:ea typeface="Calibri" panose="020F0502020204030204" pitchFamily="34" charset="0"/>
-              <a:cs typeface="Times New Roman" panose="02020603050405020304" pitchFamily="18" charset="0"/>
-            </a:endParaRPr>
-          </a:p>
-          <a:p>
-            <a:pPr marL="0" lvl="0" indent="0">
-              <a:lnSpc>
-                <a:spcPct val="107000"/>
-              </a:lnSpc>
-              <a:spcAft>
-                <a:spcPts val="800"/>
-              </a:spcAft>
-              <a:buNone/>
-            </a:pPr>
-            <a:endParaRPr lang="en-GB" sz="1800" kern="100" dirty="0">
-              <a:effectLst/>
-              <a:latin typeface="Calibri" panose="020F0502020204030204" pitchFamily="34" charset="0"/>
-              <a:ea typeface="Calibri" panose="020F0502020204030204" pitchFamily="34" charset="0"/>
-              <a:cs typeface="Times New Roman" panose="02020603050405020304" pitchFamily="18" charset="0"/>
-            </a:endParaRPr>
-          </a:p>
-        </p:txBody>
-      </p:sp>
-      <p:sp>
-        <p:nvSpPr>
-          <p:cNvPr id="6" name="Slide Number Placeholder 5">
-            <a:extLst>
-              <a:ext uri="{FF2B5EF4-FFF2-40B4-BE49-F238E27FC236}">
-                <a16:creationId xmlns:a16="http://schemas.microsoft.com/office/drawing/2014/main" id="{1C554D9F-1895-486E-BFBA-905BB2D29E08}"/>
-              </a:ext>
-            </a:extLst>
-          </p:cNvPr>
-          <p:cNvSpPr>
-            <a:spLocks noGrp="1"/>
-          </p:cNvSpPr>
-          <p:nvPr>
-            <p:ph type="sldNum" sz="quarter" idx="34"/>
-          </p:nvPr>
-        </p:nvSpPr>
-        <p:spPr/>
-        <p:txBody>
-          <a:bodyPr rtlCol="0"/>
-          <a:lstStyle/>
-          <a:p>
-            <a:pPr rtl="0"/>
-            <a:fld id="{19B51A1E-902D-48AF-9020-955120F399B6}" type="slidenum">
-              <a:rPr lang="en-GB" smtClean="0"/>
-              <a:pPr rtl="0"/>
-              <a:t>10</a:t>
-            </a:fld>
-            <a:endParaRPr lang="en-GB" dirty="0"/>
-          </a:p>
-        </p:txBody>
-      </p:sp>
-      <mc:AlternateContent xmlns:mc="http://schemas.openxmlformats.org/markup-compatibility/2006">
-        <mc:Choice xmlns:p14="http://schemas.microsoft.com/office/powerpoint/2010/main" Requires="p14">
-          <p:contentPart p14:bwMode="auto" r:id="rId4">
-            <p14:nvContentPartPr>
-              <p14:cNvPr id="5" name="Entrada de lápiz 4">
-                <a:extLst>
-                  <a:ext uri="{FF2B5EF4-FFF2-40B4-BE49-F238E27FC236}">
-                    <a16:creationId xmlns:a16="http://schemas.microsoft.com/office/drawing/2014/main" id="{3CD92FDC-B882-041E-73AE-4904DF8DF485}"/>
-                  </a:ext>
-                </a:extLst>
-              </p14:cNvPr>
-              <p14:cNvContentPartPr/>
-              <p14:nvPr/>
-            </p14:nvContentPartPr>
-            <p14:xfrm>
-              <a:off x="10161265" y="6358897"/>
-              <a:ext cx="1164600" cy="311760"/>
-            </p14:xfrm>
-          </p:contentPart>
-        </mc:Choice>
-        <mc:Fallback>
-          <p:pic>
-            <p:nvPicPr>
-              <p:cNvPr id="5" name="Entrada de lápiz 4">
-                <a:extLst>
-                  <a:ext uri="{FF2B5EF4-FFF2-40B4-BE49-F238E27FC236}">
-                    <a16:creationId xmlns:a16="http://schemas.microsoft.com/office/drawing/2014/main" id="{3CD92FDC-B882-041E-73AE-4904DF8DF485}"/>
-                  </a:ext>
-                </a:extLst>
-              </p:cNvPr>
-              <p:cNvPicPr/>
-              <p:nvPr/>
-            </p:nvPicPr>
-            <p:blipFill>
-              <a:blip r:embed="rId5"/>
-              <a:stretch>
-                <a:fillRect/>
-              </a:stretch>
-            </p:blipFill>
-            <p:spPr>
-              <a:xfrm>
-                <a:off x="10098246" y="6295970"/>
-                <a:ext cx="1290279" cy="437255"/>
-              </a:xfrm>
-              <a:prstGeom prst="rect">
-                <a:avLst/>
-              </a:prstGeom>
-            </p:spPr>
-          </p:pic>
-        </mc:Fallback>
-      </mc:AlternateContent>
-      <p:pic>
-        <p:nvPicPr>
-          <p:cNvPr id="3" name="Picture 2" descr="A diagram of software development&#10;&#10;Description automatically generated">
-            <a:extLst>
-              <a:ext uri="{FF2B5EF4-FFF2-40B4-BE49-F238E27FC236}">
-                <a16:creationId xmlns:a16="http://schemas.microsoft.com/office/drawing/2014/main" id="{819B2DE1-4514-A888-3FDF-EBF105A6E2E2}"/>
-              </a:ext>
-            </a:extLst>
-          </p:cNvPr>
-          <p:cNvPicPr>
-            <a:picLocks noChangeAspect="1"/>
-          </p:cNvPicPr>
-          <p:nvPr/>
-        </p:nvPicPr>
-        <p:blipFill>
-          <a:blip r:embed="rId6"/>
-          <a:stretch>
-            <a:fillRect/>
-          </a:stretch>
-        </p:blipFill>
-        <p:spPr>
-          <a:xfrm>
-            <a:off x="1175284" y="2057491"/>
-            <a:ext cx="6743419" cy="4134509"/>
-          </a:xfrm>
-          <a:prstGeom prst="rect">
-            <a:avLst/>
-          </a:prstGeom>
-        </p:spPr>
-      </p:pic>
-    </p:spTree>
-    <p:extLst>
-      <p:ext uri="{BB962C8B-B14F-4D97-AF65-F5344CB8AC3E}">
-        <p14:creationId xmlns:p14="http://schemas.microsoft.com/office/powerpoint/2010/main" val="1728375177"/>
-      </p:ext>
-    </p:extLst>
-  </p:cSld>
-  <p:clrMapOvr>
-    <a:masterClrMapping/>
-  </p:clrMapOvr>
-</p:sld>
-</file>
-
-<file path=ppt/slides/slide11.xml><?xml version="1.0" encoding="utf-8"?>
-<p:sld xmlns:a="http://schemas.openxmlformats.org/drawingml/2006/main" xmlns:r="http://schemas.openxmlformats.org/officeDocument/2006/relationships" xmlns:p="http://schemas.openxmlformats.org/presentationml/2006/main">
-  <p:cSld>
-    <p:spTree>
-      <p:nvGrpSpPr>
-        <p:cNvPr id="1" name=""/>
-        <p:cNvGrpSpPr/>
-        <p:nvPr/>
-      </p:nvGrpSpPr>
-      <p:grpSpPr>
-        <a:xfrm>
-          <a:off x="0" y="0"/>
-          <a:ext cx="0" cy="0"/>
-          <a:chOff x="0" y="0"/>
-          <a:chExt cx="0" cy="0"/>
-        </a:xfrm>
-      </p:grpSpPr>
-      <p:pic>
-        <p:nvPicPr>
-          <p:cNvPr id="10" name="Picture Placeholder 9" descr="Abstract architecture polygon">
-            <a:extLst>
-              <a:ext uri="{FF2B5EF4-FFF2-40B4-BE49-F238E27FC236}">
-                <a16:creationId xmlns:a16="http://schemas.microsoft.com/office/drawing/2014/main" id="{38475F7B-316A-47DC-9CBB-B074A5B5994C}"/>
-              </a:ext>
-            </a:extLst>
-          </p:cNvPr>
-          <p:cNvPicPr>
-            <a:picLocks noGrp="1" noChangeAspect="1"/>
-          </p:cNvPicPr>
-          <p:nvPr>
-            <p:ph type="pic" sz="quarter" idx="33"/>
-          </p:nvPr>
-        </p:nvPicPr>
-        <p:blipFill>
-          <a:blip r:embed="rId3"/>
-          <a:srcRect l="15" r="15"/>
-          <a:stretch>
-            <a:fillRect/>
-          </a:stretch>
-        </p:blipFill>
-        <p:spPr/>
-      </p:pic>
-      <p:sp>
-        <p:nvSpPr>
-          <p:cNvPr id="2" name="Title 1">
-            <a:extLst>
-              <a:ext uri="{FF2B5EF4-FFF2-40B4-BE49-F238E27FC236}">
-                <a16:creationId xmlns:a16="http://schemas.microsoft.com/office/drawing/2014/main" id="{3560F281-4FF6-4617-A809-AC9C15ECF18A}"/>
-              </a:ext>
-            </a:extLst>
-          </p:cNvPr>
-          <p:cNvSpPr>
-            <a:spLocks noGrp="1"/>
-          </p:cNvSpPr>
-          <p:nvPr>
-            <p:ph type="title"/>
-          </p:nvPr>
-        </p:nvSpPr>
-        <p:spPr>
-          <a:xfrm>
-            <a:off x="545946" y="534878"/>
-            <a:ext cx="6522366" cy="432000"/>
-          </a:xfrm>
-        </p:spPr>
-        <p:txBody>
-          <a:bodyPr rtlCol="0"/>
-          <a:lstStyle/>
-          <a:p>
-            <a:pPr algn="l" rtl="0"/>
-            <a:r>
-              <a:rPr lang="es-ES" dirty="0"/>
               <a:t>PRE-procesamiento</a:t>
             </a:r>
           </a:p>
@@ -11535,14 +11432,14 @@
             <a:fld id="{19B51A1E-902D-48AF-9020-955120F399B6}" type="slidenum">
               <a:rPr lang="en-GB" smtClean="0"/>
               <a:pPr rtl="0"/>
-              <a:t>11</a:t>
+              <a:t>10</a:t>
             </a:fld>
             <a:endParaRPr lang="en-GB" dirty="0"/>
           </a:p>
         </p:txBody>
       </p:sp>
-      <mc:AlternateContent xmlns:mc="http://schemas.openxmlformats.org/markup-compatibility/2006">
-        <mc:Choice xmlns:p14="http://schemas.microsoft.com/office/powerpoint/2010/main" Requires="p14">
+      <mc:AlternateContent xmlns:mc="http://schemas.openxmlformats.org/markup-compatibility/2006" xmlns:p14="http://schemas.microsoft.com/office/powerpoint/2010/main">
+        <mc:Choice Requires="p14">
           <p:contentPart p14:bwMode="auto" r:id="rId4">
             <p14:nvContentPartPr>
               <p14:cNvPr id="5" name="Entrada de lápiz 4">
@@ -11561,7 +11458,7 @@
             </p14:xfrm>
           </p:contentPart>
         </mc:Choice>
-        <mc:Fallback>
+        <mc:Fallback xmlns="">
           <p:pic>
             <p:nvPicPr>
               <p:cNvPr id="5" name="Entrada de lápiz 4">
@@ -12016,7 +11913,7 @@
 </p:sld>
 </file>
 
-<file path=ppt/slides/slide12.xml><?xml version="1.0" encoding="utf-8"?>
+<file path=ppt/slides/slide11.xml><?xml version="1.0" encoding="utf-8"?>
 <p:sld xmlns:a="http://schemas.openxmlformats.org/drawingml/2006/main" xmlns:r="http://schemas.openxmlformats.org/officeDocument/2006/relationships" xmlns:p="http://schemas.openxmlformats.org/presentationml/2006/main">
   <p:cSld>
     <p:spTree>
@@ -12217,14 +12114,14 @@
             <a:fld id="{19B51A1E-902D-48AF-9020-955120F399B6}" type="slidenum">
               <a:rPr lang="en-GB" smtClean="0"/>
               <a:pPr rtl="0"/>
-              <a:t>12</a:t>
+              <a:t>11</a:t>
             </a:fld>
             <a:endParaRPr lang="en-GB" dirty="0"/>
           </a:p>
         </p:txBody>
       </p:sp>
-      <mc:AlternateContent xmlns:mc="http://schemas.openxmlformats.org/markup-compatibility/2006">
-        <mc:Choice xmlns:p14="http://schemas.microsoft.com/office/powerpoint/2010/main" Requires="p14">
+      <mc:AlternateContent xmlns:mc="http://schemas.openxmlformats.org/markup-compatibility/2006" xmlns:p14="http://schemas.microsoft.com/office/powerpoint/2010/main">
+        <mc:Choice Requires="p14">
           <p:contentPart p14:bwMode="auto" r:id="rId4">
             <p14:nvContentPartPr>
               <p14:cNvPr id="5" name="Entrada de lápiz 4">
@@ -12243,7 +12140,7 @@
             </p14:xfrm>
           </p:contentPart>
         </mc:Choice>
-        <mc:Fallback>
+        <mc:Fallback xmlns="">
           <p:pic>
             <p:nvPicPr>
               <p:cNvPr id="5" name="Entrada de lápiz 4">
@@ -12317,7 +12214,7 @@
 </p:sld>
 </file>
 
-<file path=ppt/slides/slide13.xml><?xml version="1.0" encoding="utf-8"?>
+<file path=ppt/slides/slide12.xml><?xml version="1.0" encoding="utf-8"?>
 <p:sld xmlns:a="http://schemas.openxmlformats.org/drawingml/2006/main" xmlns:r="http://schemas.openxmlformats.org/officeDocument/2006/relationships" xmlns:p="http://schemas.openxmlformats.org/presentationml/2006/main">
   <p:cSld>
     <p:spTree>
@@ -12650,14 +12547,14 @@
             <a:fld id="{19B51A1E-902D-48AF-9020-955120F399B6}" type="slidenum">
               <a:rPr lang="en-GB" smtClean="0"/>
               <a:pPr rtl="0"/>
-              <a:t>13</a:t>
+              <a:t>12</a:t>
             </a:fld>
             <a:endParaRPr lang="en-GB" dirty="0"/>
           </a:p>
         </p:txBody>
       </p:sp>
-      <mc:AlternateContent xmlns:mc="http://schemas.openxmlformats.org/markup-compatibility/2006">
-        <mc:Choice xmlns:p14="http://schemas.microsoft.com/office/powerpoint/2010/main" Requires="p14">
+      <mc:AlternateContent xmlns:mc="http://schemas.openxmlformats.org/markup-compatibility/2006" xmlns:p14="http://schemas.microsoft.com/office/powerpoint/2010/main">
+        <mc:Choice Requires="p14">
           <p:contentPart p14:bwMode="auto" r:id="rId4">
             <p14:nvContentPartPr>
               <p14:cNvPr id="5" name="Entrada de lápiz 4">
@@ -12676,7 +12573,7 @@
             </p14:xfrm>
           </p:contentPart>
         </mc:Choice>
-        <mc:Fallback>
+        <mc:Fallback xmlns="">
           <p:pic>
             <p:nvPicPr>
               <p:cNvPr id="5" name="Entrada de lápiz 4">
@@ -13023,6 +12920,545 @@
 </p:sld>
 </file>
 
+<file path=ppt/slides/slide13.xml><?xml version="1.0" encoding="utf-8"?>
+<p:sld xmlns:a="http://schemas.openxmlformats.org/drawingml/2006/main" xmlns:r="http://schemas.openxmlformats.org/officeDocument/2006/relationships" xmlns:p="http://schemas.openxmlformats.org/presentationml/2006/main">
+  <p:cSld>
+    <p:spTree>
+      <p:nvGrpSpPr>
+        <p:cNvPr id="1" name=""/>
+        <p:cNvGrpSpPr/>
+        <p:nvPr/>
+      </p:nvGrpSpPr>
+      <p:grpSpPr>
+        <a:xfrm>
+          <a:off x="0" y="0"/>
+          <a:ext cx="0" cy="0"/>
+          <a:chOff x="0" y="0"/>
+          <a:chExt cx="0" cy="0"/>
+        </a:xfrm>
+      </p:grpSpPr>
+      <p:pic>
+        <p:nvPicPr>
+          <p:cNvPr id="10" name="Picture Placeholder 9" descr="Abstract architecture polygon">
+            <a:extLst>
+              <a:ext uri="{FF2B5EF4-FFF2-40B4-BE49-F238E27FC236}">
+                <a16:creationId xmlns:a16="http://schemas.microsoft.com/office/drawing/2014/main" id="{38475F7B-316A-47DC-9CBB-B074A5B5994C}"/>
+              </a:ext>
+            </a:extLst>
+          </p:cNvPr>
+          <p:cNvPicPr>
+            <a:picLocks noGrp="1" noChangeAspect="1"/>
+          </p:cNvPicPr>
+          <p:nvPr>
+            <p:ph type="pic" sz="quarter" idx="33"/>
+          </p:nvPr>
+        </p:nvPicPr>
+        <p:blipFill>
+          <a:blip r:embed="rId3"/>
+          <a:srcRect l="15" r="15"/>
+          <a:stretch>
+            <a:fillRect/>
+          </a:stretch>
+        </p:blipFill>
+        <p:spPr/>
+      </p:pic>
+      <p:sp>
+        <p:nvSpPr>
+          <p:cNvPr id="2" name="Title 1">
+            <a:extLst>
+              <a:ext uri="{FF2B5EF4-FFF2-40B4-BE49-F238E27FC236}">
+                <a16:creationId xmlns:a16="http://schemas.microsoft.com/office/drawing/2014/main" id="{3560F281-4FF6-4617-A809-AC9C15ECF18A}"/>
+              </a:ext>
+            </a:extLst>
+          </p:cNvPr>
+          <p:cNvSpPr>
+            <a:spLocks noGrp="1"/>
+          </p:cNvSpPr>
+          <p:nvPr>
+            <p:ph type="title"/>
+          </p:nvPr>
+        </p:nvSpPr>
+        <p:spPr>
+          <a:xfrm>
+            <a:off x="545946" y="534878"/>
+            <a:ext cx="6522366" cy="432000"/>
+          </a:xfrm>
+        </p:spPr>
+        <p:txBody>
+          <a:bodyPr rtlCol="0"/>
+          <a:lstStyle/>
+          <a:p>
+            <a:pPr algn="l" rtl="0"/>
+            <a:r>
+              <a:rPr lang="es-ES" dirty="0"/>
+              <a:t>Features y Targets</a:t>
+            </a:r>
+          </a:p>
+        </p:txBody>
+      </p:sp>
+      <p:sp>
+        <p:nvSpPr>
+          <p:cNvPr id="4" name="Content Placeholder 3">
+            <a:extLst>
+              <a:ext uri="{FF2B5EF4-FFF2-40B4-BE49-F238E27FC236}">
+                <a16:creationId xmlns:a16="http://schemas.microsoft.com/office/drawing/2014/main" id="{D355C61F-C8F1-4977-8E1F-F16C0D9EA88C}"/>
+              </a:ext>
+            </a:extLst>
+          </p:cNvPr>
+          <p:cNvSpPr>
+            <a:spLocks noGrp="1"/>
+          </p:cNvSpPr>
+          <p:nvPr>
+            <p:ph sz="half" idx="1"/>
+          </p:nvPr>
+        </p:nvSpPr>
+        <p:spPr>
+          <a:xfrm>
+            <a:off x="545946" y="1339731"/>
+            <a:ext cx="8268870" cy="4852269"/>
+          </a:xfrm>
+        </p:spPr>
+        <p:txBody>
+          <a:bodyPr rtlCol="0"/>
+          <a:lstStyle/>
+          <a:p>
+            <a:pPr marL="0" lvl="0" indent="0">
+              <a:lnSpc>
+                <a:spcPct val="107000"/>
+              </a:lnSpc>
+              <a:spcAft>
+                <a:spcPts val="800"/>
+              </a:spcAft>
+              <a:buNone/>
+            </a:pPr>
+            <a:r>
+              <a:rPr lang="es-ES" sz="1800" kern="100" dirty="0">
+                <a:effectLst/>
+                <a:latin typeface="Calibri" panose="020F0502020204030204" pitchFamily="34" charset="0"/>
+                <a:ea typeface="Calibri" panose="020F0502020204030204" pitchFamily="34" charset="0"/>
+                <a:cs typeface="Times New Roman" panose="02020603050405020304" pitchFamily="18" charset="0"/>
+              </a:rPr>
+              <a:t>Ejemplo del valor x del conjunto </a:t>
+            </a:r>
+            <a:r>
+              <a:rPr lang="es-ES" kern="100" dirty="0">
+                <a:latin typeface="Calibri" panose="020F0502020204030204" pitchFamily="34" charset="0"/>
+                <a:ea typeface="Calibri" panose="020F0502020204030204" pitchFamily="34" charset="0"/>
+                <a:cs typeface="Times New Roman" panose="02020603050405020304" pitchFamily="18" charset="0"/>
+              </a:rPr>
+              <a:t>(288, 6, 162) </a:t>
+            </a:r>
+          </a:p>
+          <a:p>
+            <a:pPr marL="0" lvl="0" indent="0">
+              <a:lnSpc>
+                <a:spcPct val="107000"/>
+              </a:lnSpc>
+              <a:spcAft>
+                <a:spcPts val="800"/>
+              </a:spcAft>
+              <a:buNone/>
+            </a:pPr>
+            <a:endParaRPr lang="es-ES" sz="1800" kern="100" dirty="0">
+              <a:effectLst/>
+              <a:latin typeface="Calibri" panose="020F0502020204030204" pitchFamily="34" charset="0"/>
+              <a:ea typeface="Calibri" panose="020F0502020204030204" pitchFamily="34" charset="0"/>
+              <a:cs typeface="Times New Roman" panose="02020603050405020304" pitchFamily="18" charset="0"/>
+            </a:endParaRPr>
+          </a:p>
+          <a:p>
+            <a:pPr marL="0" lvl="0" indent="0">
+              <a:lnSpc>
+                <a:spcPct val="107000"/>
+              </a:lnSpc>
+              <a:spcAft>
+                <a:spcPts val="800"/>
+              </a:spcAft>
+              <a:buNone/>
+            </a:pPr>
+            <a:endParaRPr lang="es-ES" kern="100" dirty="0">
+              <a:latin typeface="Calibri" panose="020F0502020204030204" pitchFamily="34" charset="0"/>
+              <a:ea typeface="Calibri" panose="020F0502020204030204" pitchFamily="34" charset="0"/>
+              <a:cs typeface="Times New Roman" panose="02020603050405020304" pitchFamily="18" charset="0"/>
+            </a:endParaRPr>
+          </a:p>
+          <a:p>
+            <a:pPr marL="0" lvl="0" indent="0">
+              <a:lnSpc>
+                <a:spcPct val="107000"/>
+              </a:lnSpc>
+              <a:spcAft>
+                <a:spcPts val="800"/>
+              </a:spcAft>
+              <a:buNone/>
+            </a:pPr>
+            <a:endParaRPr lang="es-ES" sz="1800" kern="100" dirty="0">
+              <a:effectLst/>
+              <a:latin typeface="Calibri" panose="020F0502020204030204" pitchFamily="34" charset="0"/>
+              <a:ea typeface="Calibri" panose="020F0502020204030204" pitchFamily="34" charset="0"/>
+              <a:cs typeface="Times New Roman" panose="02020603050405020304" pitchFamily="18" charset="0"/>
+            </a:endParaRPr>
+          </a:p>
+          <a:p>
+            <a:pPr marL="0" lvl="0" indent="0">
+              <a:lnSpc>
+                <a:spcPct val="107000"/>
+              </a:lnSpc>
+              <a:spcAft>
+                <a:spcPts val="800"/>
+              </a:spcAft>
+              <a:buNone/>
+            </a:pPr>
+            <a:endParaRPr lang="es-ES" kern="100" dirty="0">
+              <a:latin typeface="Calibri" panose="020F0502020204030204" pitchFamily="34" charset="0"/>
+              <a:ea typeface="Calibri" panose="020F0502020204030204" pitchFamily="34" charset="0"/>
+              <a:cs typeface="Times New Roman" panose="02020603050405020304" pitchFamily="18" charset="0"/>
+            </a:endParaRPr>
+          </a:p>
+          <a:p>
+            <a:pPr marL="0" indent="0">
+              <a:lnSpc>
+                <a:spcPct val="107000"/>
+              </a:lnSpc>
+              <a:spcAft>
+                <a:spcPts val="800"/>
+              </a:spcAft>
+              <a:buNone/>
+            </a:pPr>
+            <a:r>
+              <a:rPr lang="es-ES" sz="1800" kern="100" dirty="0">
+                <a:effectLst/>
+                <a:latin typeface="Calibri" panose="020F0502020204030204" pitchFamily="34" charset="0"/>
+                <a:ea typeface="Calibri" panose="020F0502020204030204" pitchFamily="34" charset="0"/>
+                <a:cs typeface="Times New Roman" panose="02020603050405020304" pitchFamily="18" charset="0"/>
+              </a:rPr>
+              <a:t>Ejemplo del valor y del conjunto </a:t>
+            </a:r>
+            <a:r>
+              <a:rPr lang="es-ES" kern="100" dirty="0">
+                <a:latin typeface="Calibri" panose="020F0502020204030204" pitchFamily="34" charset="0"/>
+                <a:ea typeface="Calibri" panose="020F0502020204030204" pitchFamily="34" charset="0"/>
+                <a:cs typeface="Times New Roman" panose="02020603050405020304" pitchFamily="18" charset="0"/>
+              </a:rPr>
+              <a:t>(288, 27) </a:t>
+            </a:r>
+          </a:p>
+          <a:p>
+            <a:pPr marL="0" indent="0">
+              <a:lnSpc>
+                <a:spcPct val="107000"/>
+              </a:lnSpc>
+              <a:spcAft>
+                <a:spcPts val="800"/>
+              </a:spcAft>
+              <a:buNone/>
+            </a:pPr>
+            <a:endParaRPr lang="es-ES" kern="100" dirty="0">
+              <a:latin typeface="Calibri" panose="020F0502020204030204" pitchFamily="34" charset="0"/>
+              <a:ea typeface="Calibri" panose="020F0502020204030204" pitchFamily="34" charset="0"/>
+              <a:cs typeface="Times New Roman" panose="02020603050405020304" pitchFamily="18" charset="0"/>
+            </a:endParaRPr>
+          </a:p>
+          <a:p>
+            <a:pPr marL="0" lvl="0" indent="0">
+              <a:lnSpc>
+                <a:spcPct val="107000"/>
+              </a:lnSpc>
+              <a:spcAft>
+                <a:spcPts val="800"/>
+              </a:spcAft>
+              <a:buNone/>
+            </a:pPr>
+            <a:endParaRPr lang="es-ES" sz="1800" kern="100" dirty="0">
+              <a:effectLst/>
+              <a:latin typeface="Calibri" panose="020F0502020204030204" pitchFamily="34" charset="0"/>
+              <a:ea typeface="Calibri" panose="020F0502020204030204" pitchFamily="34" charset="0"/>
+              <a:cs typeface="Times New Roman" panose="02020603050405020304" pitchFamily="18" charset="0"/>
+            </a:endParaRPr>
+          </a:p>
+          <a:p>
+            <a:pPr marL="0" lvl="0" indent="0">
+              <a:lnSpc>
+                <a:spcPct val="107000"/>
+              </a:lnSpc>
+              <a:spcAft>
+                <a:spcPts val="800"/>
+              </a:spcAft>
+              <a:buNone/>
+            </a:pPr>
+            <a:endParaRPr lang="en-GB" sz="1800" kern="100" dirty="0">
+              <a:effectLst/>
+              <a:latin typeface="Calibri" panose="020F0502020204030204" pitchFamily="34" charset="0"/>
+              <a:ea typeface="Calibri" panose="020F0502020204030204" pitchFamily="34" charset="0"/>
+              <a:cs typeface="Times New Roman" panose="02020603050405020304" pitchFamily="18" charset="0"/>
+            </a:endParaRPr>
+          </a:p>
+        </p:txBody>
+      </p:sp>
+      <p:sp>
+        <p:nvSpPr>
+          <p:cNvPr id="6" name="Slide Number Placeholder 5">
+            <a:extLst>
+              <a:ext uri="{FF2B5EF4-FFF2-40B4-BE49-F238E27FC236}">
+                <a16:creationId xmlns:a16="http://schemas.microsoft.com/office/drawing/2014/main" id="{1C554D9F-1895-486E-BFBA-905BB2D29E08}"/>
+              </a:ext>
+            </a:extLst>
+          </p:cNvPr>
+          <p:cNvSpPr>
+            <a:spLocks noGrp="1"/>
+          </p:cNvSpPr>
+          <p:nvPr>
+            <p:ph type="sldNum" sz="quarter" idx="34"/>
+          </p:nvPr>
+        </p:nvSpPr>
+        <p:spPr/>
+        <p:txBody>
+          <a:bodyPr rtlCol="0"/>
+          <a:lstStyle/>
+          <a:p>
+            <a:pPr rtl="0"/>
+            <a:fld id="{19B51A1E-902D-48AF-9020-955120F399B6}" type="slidenum">
+              <a:rPr lang="en-GB" smtClean="0"/>
+              <a:pPr rtl="0"/>
+              <a:t>13</a:t>
+            </a:fld>
+            <a:endParaRPr lang="en-GB" dirty="0"/>
+          </a:p>
+        </p:txBody>
+      </p:sp>
+      <mc:AlternateContent xmlns:mc="http://schemas.openxmlformats.org/markup-compatibility/2006" xmlns:p14="http://schemas.microsoft.com/office/powerpoint/2010/main">
+        <mc:Choice Requires="p14">
+          <p:contentPart p14:bwMode="auto" r:id="rId4">
+            <p14:nvContentPartPr>
+              <p14:cNvPr id="5" name="Entrada de lápiz 4">
+                <a:extLst>
+                  <a:ext uri="{FF2B5EF4-FFF2-40B4-BE49-F238E27FC236}">
+                    <a16:creationId xmlns:a16="http://schemas.microsoft.com/office/drawing/2014/main" id="{3CD92FDC-B882-041E-73AE-4904DF8DF485}"/>
+                  </a:ext>
+                </a:extLst>
+              </p14:cNvPr>
+              <p14:cNvContentPartPr/>
+              <p14:nvPr/>
+            </p14:nvContentPartPr>
+            <p14:xfrm>
+              <a:off x="10161265" y="6358897"/>
+              <a:ext cx="1164600" cy="311760"/>
+            </p14:xfrm>
+          </p:contentPart>
+        </mc:Choice>
+        <mc:Fallback xmlns="">
+          <p:pic>
+            <p:nvPicPr>
+              <p:cNvPr id="5" name="Entrada de lápiz 4">
+                <a:extLst>
+                  <a:ext uri="{FF2B5EF4-FFF2-40B4-BE49-F238E27FC236}">
+                    <a16:creationId xmlns:a16="http://schemas.microsoft.com/office/drawing/2014/main" id="{3CD92FDC-B882-041E-73AE-4904DF8DF485}"/>
+                  </a:ext>
+                </a:extLst>
+              </p:cNvPr>
+              <p:cNvPicPr/>
+              <p:nvPr/>
+            </p:nvPicPr>
+            <p:blipFill>
+              <a:blip r:embed="rId5"/>
+              <a:stretch>
+                <a:fillRect/>
+              </a:stretch>
+            </p:blipFill>
+            <p:spPr>
+              <a:xfrm>
+                <a:off x="10098246" y="6295970"/>
+                <a:ext cx="1290279" cy="437255"/>
+              </a:xfrm>
+              <a:prstGeom prst="rect">
+                <a:avLst/>
+              </a:prstGeom>
+            </p:spPr>
+          </p:pic>
+        </mc:Fallback>
+      </mc:AlternateContent>
+      <p:pic>
+        <p:nvPicPr>
+          <p:cNvPr id="8" name="Picture 7">
+            <a:extLst>
+              <a:ext uri="{FF2B5EF4-FFF2-40B4-BE49-F238E27FC236}">
+                <a16:creationId xmlns:a16="http://schemas.microsoft.com/office/drawing/2014/main" id="{07728FC2-7E60-270E-09AB-68294F108C54}"/>
+              </a:ext>
+            </a:extLst>
+          </p:cNvPr>
+          <p:cNvPicPr>
+            <a:picLocks noChangeAspect="1"/>
+          </p:cNvPicPr>
+          <p:nvPr/>
+        </p:nvPicPr>
+        <p:blipFill>
+          <a:blip r:embed="rId6"/>
+          <a:stretch>
+            <a:fillRect/>
+          </a:stretch>
+        </p:blipFill>
+        <p:spPr>
+          <a:xfrm>
+            <a:off x="827120" y="2022018"/>
+            <a:ext cx="7697274" cy="1991003"/>
+          </a:xfrm>
+          <a:prstGeom prst="rect">
+            <a:avLst/>
+          </a:prstGeom>
+        </p:spPr>
+      </p:pic>
+      <p:pic>
+        <p:nvPicPr>
+          <p:cNvPr id="11" name="Picture 10">
+            <a:extLst>
+              <a:ext uri="{FF2B5EF4-FFF2-40B4-BE49-F238E27FC236}">
+                <a16:creationId xmlns:a16="http://schemas.microsoft.com/office/drawing/2014/main" id="{B43C0003-6ABC-5A17-216E-DDB805E36544}"/>
+              </a:ext>
+            </a:extLst>
+          </p:cNvPr>
+          <p:cNvPicPr>
+            <a:picLocks noChangeAspect="1"/>
+          </p:cNvPicPr>
+          <p:nvPr/>
+        </p:nvPicPr>
+        <p:blipFill>
+          <a:blip r:embed="rId7"/>
+          <a:stretch>
+            <a:fillRect/>
+          </a:stretch>
+        </p:blipFill>
+        <p:spPr>
+          <a:xfrm>
+            <a:off x="1098620" y="4695308"/>
+            <a:ext cx="7154273" cy="724001"/>
+          </a:xfrm>
+          <a:prstGeom prst="rect">
+            <a:avLst/>
+          </a:prstGeom>
+        </p:spPr>
+      </p:pic>
+    </p:spTree>
+    <p:extLst>
+      <p:ext uri="{BB962C8B-B14F-4D97-AF65-F5344CB8AC3E}">
+        <p14:creationId xmlns:p14="http://schemas.microsoft.com/office/powerpoint/2010/main" val="2442479917"/>
+      </p:ext>
+    </p:extLst>
+  </p:cSld>
+  <p:clrMapOvr>
+    <a:masterClrMapping/>
+  </p:clrMapOvr>
+  <p:timing>
+    <p:tnLst>
+      <p:par>
+        <p:cTn id="1" dur="indefinite" restart="never" nodeType="tmRoot">
+          <p:childTnLst>
+            <p:seq concurrent="1" nextAc="seek">
+              <p:cTn id="2" dur="indefinite" nodeType="mainSeq">
+                <p:childTnLst>
+                  <p:par>
+                    <p:cTn id="3" fill="hold">
+                      <p:stCondLst>
+                        <p:cond delay="indefinite"/>
+                      </p:stCondLst>
+                      <p:childTnLst>
+                        <p:par>
+                          <p:cTn id="4" fill="hold">
+                            <p:stCondLst>
+                              <p:cond delay="0"/>
+                            </p:stCondLst>
+                            <p:childTnLst>
+                              <p:par>
+                                <p:cTn id="5" presetID="1" presetClass="entr" presetSubtype="0" fill="hold" grpId="0" nodeType="clickEffect">
+                                  <p:stCondLst>
+                                    <p:cond delay="0"/>
+                                  </p:stCondLst>
+                                  <p:childTnLst>
+                                    <p:set>
+                                      <p:cBhvr>
+                                        <p:cTn id="6" dur="1" fill="hold">
+                                          <p:stCondLst>
+                                            <p:cond delay="0"/>
+                                          </p:stCondLst>
+                                        </p:cTn>
+                                        <p:tgtEl>
+                                          <p:spTgt spid="4">
+                                            <p:txEl>
+                                              <p:pRg st="5" end="5"/>
+                                            </p:txEl>
+                                          </p:spTgt>
+                                        </p:tgtEl>
+                                        <p:attrNameLst>
+                                          <p:attrName>style.visibility</p:attrName>
+                                        </p:attrNameLst>
+                                      </p:cBhvr>
+                                      <p:to>
+                                        <p:strVal val="visible"/>
+                                      </p:to>
+                                    </p:set>
+                                  </p:childTnLst>
+                                </p:cTn>
+                              </p:par>
+                              <p:par>
+                                <p:cTn id="7" presetID="1" presetClass="entr" presetSubtype="0" fill="hold" nodeType="withEffect">
+                                  <p:stCondLst>
+                                    <p:cond delay="0"/>
+                                  </p:stCondLst>
+                                  <p:childTnLst>
+                                    <p:set>
+                                      <p:cBhvr>
+                                        <p:cTn id="8" dur="1" fill="hold">
+                                          <p:stCondLst>
+                                            <p:cond delay="0"/>
+                                          </p:stCondLst>
+                                        </p:cTn>
+                                        <p:tgtEl>
+                                          <p:spTgt spid="11"/>
+                                        </p:tgtEl>
+                                        <p:attrNameLst>
+                                          <p:attrName>style.visibility</p:attrName>
+                                        </p:attrNameLst>
+                                      </p:cBhvr>
+                                      <p:to>
+                                        <p:strVal val="visible"/>
+                                      </p:to>
+                                    </p:set>
+                                  </p:childTnLst>
+                                </p:cTn>
+                              </p:par>
+                            </p:childTnLst>
+                          </p:cTn>
+                        </p:par>
+                      </p:childTnLst>
+                    </p:cTn>
+                  </p:par>
+                </p:childTnLst>
+              </p:cTn>
+              <p:prevCondLst>
+                <p:cond evt="onPrev" delay="0">
+                  <p:tgtEl>
+                    <p:sldTgt/>
+                  </p:tgtEl>
+                </p:cond>
+              </p:prevCondLst>
+              <p:nextCondLst>
+                <p:cond evt="onNext" delay="0">
+                  <p:tgtEl>
+                    <p:sldTgt/>
+                  </p:tgtEl>
+                </p:cond>
+              </p:nextCondLst>
+            </p:seq>
+          </p:childTnLst>
+        </p:cTn>
+      </p:par>
+    </p:tnLst>
+    <p:bldLst>
+      <p:bldP spid="4" grpId="0" uiExpand="1" build="p"/>
+    </p:bldLst>
+  </p:timing>
+</p:sld>
+</file>
+
 <file path=ppt/slides/slide14.xml><?xml version="1.0" encoding="utf-8"?>
 <p:sld xmlns:a="http://schemas.openxmlformats.org/drawingml/2006/main" xmlns:r="http://schemas.openxmlformats.org/officeDocument/2006/relationships" xmlns:p="http://schemas.openxmlformats.org/presentationml/2006/main">
   <p:cSld>
@@ -13356,8 +13792,8 @@
           </a:p>
         </p:txBody>
       </p:sp>
-      <mc:AlternateContent xmlns:mc="http://schemas.openxmlformats.org/markup-compatibility/2006">
-        <mc:Choice xmlns:p14="http://schemas.microsoft.com/office/powerpoint/2010/main" Requires="p14">
+      <mc:AlternateContent xmlns:mc="http://schemas.openxmlformats.org/markup-compatibility/2006" xmlns:p14="http://schemas.microsoft.com/office/powerpoint/2010/main">
+        <mc:Choice Requires="p14">
           <p:contentPart p14:bwMode="auto" r:id="rId4">
             <p14:nvContentPartPr>
               <p14:cNvPr id="5" name="Entrada de lápiz 4">
@@ -13376,7 +13812,7 @@
             </p14:xfrm>
           </p:contentPart>
         </mc:Choice>
-        <mc:Fallback>
+        <mc:Fallback xmlns="">
           <p:pic>
             <p:nvPicPr>
               <p:cNvPr id="5" name="Entrada de lápiz 4">
@@ -14007,8 +14443,8 @@
           </a:p>
         </p:txBody>
       </p:sp>
-      <mc:AlternateContent xmlns:mc="http://schemas.openxmlformats.org/markup-compatibility/2006">
-        <mc:Choice xmlns:p14="http://schemas.microsoft.com/office/powerpoint/2010/main" Requires="p14">
+      <mc:AlternateContent xmlns:mc="http://schemas.openxmlformats.org/markup-compatibility/2006" xmlns:p14="http://schemas.microsoft.com/office/powerpoint/2010/main">
+        <mc:Choice Requires="p14">
           <p:contentPart p14:bwMode="auto" r:id="rId4">
             <p14:nvContentPartPr>
               <p14:cNvPr id="5" name="Entrada de lápiz 4">
@@ -14027,7 +14463,7 @@
             </p14:xfrm>
           </p:contentPart>
         </mc:Choice>
-        <mc:Fallback>
+        <mc:Fallback xmlns="">
           <p:pic>
             <p:nvPicPr>
               <p:cNvPr id="5" name="Entrada de lápiz 4">
@@ -14505,8 +14941,8 @@
           </a:p>
         </p:txBody>
       </p:sp>
-      <mc:AlternateContent xmlns:mc="http://schemas.openxmlformats.org/markup-compatibility/2006">
-        <mc:Choice xmlns:p14="http://schemas.microsoft.com/office/powerpoint/2010/main" Requires="p14">
+      <mc:AlternateContent xmlns:mc="http://schemas.openxmlformats.org/markup-compatibility/2006" xmlns:p14="http://schemas.microsoft.com/office/powerpoint/2010/main">
+        <mc:Choice Requires="p14">
           <p:contentPart p14:bwMode="auto" r:id="rId4">
             <p14:nvContentPartPr>
               <p14:cNvPr id="5" name="Entrada de lápiz 4">
@@ -14525,7 +14961,7 @@
             </p14:xfrm>
           </p:contentPart>
         </mc:Choice>
-        <mc:Fallback>
+        <mc:Fallback xmlns="">
           <p:pic>
             <p:nvPicPr>
               <p:cNvPr id="5" name="Entrada de lápiz 4">
@@ -14999,8 +15435,8 @@
           </a:p>
         </p:txBody>
       </p:sp>
-      <mc:AlternateContent xmlns:mc="http://schemas.openxmlformats.org/markup-compatibility/2006">
-        <mc:Choice xmlns:p14="http://schemas.microsoft.com/office/powerpoint/2010/main" Requires="p14">
+      <mc:AlternateContent xmlns:mc="http://schemas.openxmlformats.org/markup-compatibility/2006" xmlns:p14="http://schemas.microsoft.com/office/powerpoint/2010/main">
+        <mc:Choice Requires="p14">
           <p:contentPart p14:bwMode="auto" r:id="rId4">
             <p14:nvContentPartPr>
               <p14:cNvPr id="5" name="Entrada de lápiz 4">
@@ -15019,7 +15455,7 @@
             </p14:xfrm>
           </p:contentPart>
         </mc:Choice>
-        <mc:Fallback>
+        <mc:Fallback xmlns="">
           <p:pic>
             <p:nvPicPr>
               <p:cNvPr id="5" name="Entrada de lápiz 4">
@@ -16610,7 +17046,7 @@
             <a:pPr algn="l" rtl="0"/>
             <a:r>
               <a:rPr lang="es-ES" dirty="0"/>
-              <a:t>Aumento de datos</a:t>
+              <a:t>Data Augmentation</a:t>
             </a:r>
           </a:p>
         </p:txBody>
@@ -16762,8 +17198,8 @@
           </a:p>
         </p:txBody>
       </p:sp>
-      <mc:AlternateContent xmlns:mc="http://schemas.openxmlformats.org/markup-compatibility/2006">
-        <mc:Choice xmlns:p14="http://schemas.microsoft.com/office/powerpoint/2010/main" Requires="p14">
+      <mc:AlternateContent xmlns:mc="http://schemas.openxmlformats.org/markup-compatibility/2006" xmlns:p14="http://schemas.microsoft.com/office/powerpoint/2010/main">
+        <mc:Choice Requires="p14">
           <p:contentPart p14:bwMode="auto" r:id="rId4">
             <p14:nvContentPartPr>
               <p14:cNvPr id="5" name="Entrada de lápiz 4">
@@ -16782,7 +17218,7 @@
             </p14:xfrm>
           </p:contentPart>
         </mc:Choice>
-        <mc:Fallback>
+        <mc:Fallback xmlns="">
           <p:pic>
             <p:nvPicPr>
               <p:cNvPr id="5" name="Entrada de lápiz 4">
@@ -17018,6 +17454,775 @@
         <p:spPr>
           <a:xfrm>
             <a:off x="545946" y="534878"/>
+            <a:ext cx="6522366" cy="432000"/>
+          </a:xfrm>
+        </p:spPr>
+        <p:txBody>
+          <a:bodyPr rtlCol="0"/>
+          <a:lstStyle/>
+          <a:p>
+            <a:pPr algn="l" rtl="0"/>
+            <a:r>
+              <a:rPr lang="es-ES" dirty="0"/>
+              <a:t>Integración con la Nube</a:t>
+            </a:r>
+          </a:p>
+        </p:txBody>
+      </p:sp>
+      <p:sp>
+        <p:nvSpPr>
+          <p:cNvPr id="4" name="Content Placeholder 3">
+            <a:extLst>
+              <a:ext uri="{FF2B5EF4-FFF2-40B4-BE49-F238E27FC236}">
+                <a16:creationId xmlns:a16="http://schemas.microsoft.com/office/drawing/2014/main" id="{D355C61F-C8F1-4977-8E1F-F16C0D9EA88C}"/>
+              </a:ext>
+            </a:extLst>
+          </p:cNvPr>
+          <p:cNvSpPr>
+            <a:spLocks noGrp="1"/>
+          </p:cNvSpPr>
+          <p:nvPr>
+            <p:ph sz="half" idx="1"/>
+          </p:nvPr>
+        </p:nvSpPr>
+        <p:spPr>
+          <a:xfrm>
+            <a:off x="545946" y="1339731"/>
+            <a:ext cx="8323734" cy="5019166"/>
+          </a:xfrm>
+        </p:spPr>
+        <p:txBody>
+          <a:bodyPr rtlCol="0"/>
+          <a:lstStyle/>
+          <a:p>
+            <a:pPr marL="0" lvl="0" indent="0">
+              <a:lnSpc>
+                <a:spcPct val="107000"/>
+              </a:lnSpc>
+              <a:spcAft>
+                <a:spcPts val="800"/>
+              </a:spcAft>
+              <a:buNone/>
+            </a:pPr>
+            <a:r>
+              <a:rPr lang="es-ES" sz="1800" kern="100" dirty="0">
+                <a:effectLst/>
+                <a:latin typeface="Calibri" panose="020F0502020204030204" pitchFamily="34" charset="0"/>
+                <a:ea typeface="Calibri" panose="020F0502020204030204" pitchFamily="34" charset="0"/>
+                <a:cs typeface="Times New Roman" panose="02020603050405020304" pitchFamily="18" charset="0"/>
+              </a:rPr>
+              <a:t>Recogida de </a:t>
+            </a:r>
+            <a:r>
+              <a:rPr lang="es-ES" sz="1800" kern="100">
+                <a:effectLst/>
+                <a:latin typeface="Calibri" panose="020F0502020204030204" pitchFamily="34" charset="0"/>
+                <a:ea typeface="Calibri" panose="020F0502020204030204" pitchFamily="34" charset="0"/>
+                <a:cs typeface="Times New Roman" panose="02020603050405020304" pitchFamily="18" charset="0"/>
+              </a:rPr>
+              <a:t>datos </a:t>
+            </a:r>
+            <a:r>
+              <a:rPr lang="es-ES" kern="100">
+                <a:latin typeface="Calibri" panose="020F0502020204030204" pitchFamily="34" charset="0"/>
+                <a:ea typeface="Calibri" panose="020F0502020204030204" pitchFamily="34" charset="0"/>
+                <a:cs typeface="Times New Roman" panose="02020603050405020304" pitchFamily="18" charset="0"/>
+              </a:rPr>
+              <a:t>a</a:t>
+            </a:r>
+            <a:r>
+              <a:rPr lang="es-ES" sz="1800" kern="100">
+                <a:effectLst/>
+                <a:latin typeface="Calibri" panose="020F0502020204030204" pitchFamily="34" charset="0"/>
+                <a:ea typeface="Calibri" panose="020F0502020204030204" pitchFamily="34" charset="0"/>
+                <a:cs typeface="Times New Roman" panose="02020603050405020304" pitchFamily="18" charset="0"/>
+              </a:rPr>
+              <a:t>utomatizada </a:t>
+            </a:r>
+            <a:r>
+              <a:rPr lang="es-ES" sz="1800" kern="100" dirty="0">
+                <a:effectLst/>
+                <a:latin typeface="Calibri" panose="020F0502020204030204" pitchFamily="34" charset="0"/>
+                <a:ea typeface="Calibri" panose="020F0502020204030204" pitchFamily="34" charset="0"/>
+                <a:cs typeface="Times New Roman" panose="02020603050405020304" pitchFamily="18" charset="0"/>
+              </a:rPr>
+              <a:t>con seis funciones Lambda en la nube de Amazon.</a:t>
+            </a:r>
+            <a:endParaRPr lang="es-ES" kern="100" dirty="0">
+              <a:latin typeface="Calibri" panose="020F0502020204030204" pitchFamily="34" charset="0"/>
+              <a:ea typeface="Calibri" panose="020F0502020204030204" pitchFamily="34" charset="0"/>
+              <a:cs typeface="Times New Roman" panose="02020603050405020304" pitchFamily="18" charset="0"/>
+            </a:endParaRPr>
+          </a:p>
+          <a:p>
+            <a:pPr marL="0" lvl="0" indent="0">
+              <a:lnSpc>
+                <a:spcPct val="107000"/>
+              </a:lnSpc>
+              <a:spcAft>
+                <a:spcPts val="800"/>
+              </a:spcAft>
+              <a:buNone/>
+            </a:pPr>
+            <a:endParaRPr lang="es-ES" sz="1800" kern="100" dirty="0">
+              <a:effectLst/>
+              <a:latin typeface="Calibri" panose="020F0502020204030204" pitchFamily="34" charset="0"/>
+              <a:ea typeface="Calibri" panose="020F0502020204030204" pitchFamily="34" charset="0"/>
+              <a:cs typeface="Times New Roman" panose="02020603050405020304" pitchFamily="18" charset="0"/>
+            </a:endParaRPr>
+          </a:p>
+          <a:p>
+            <a:pPr marL="0" lvl="0" indent="0">
+              <a:lnSpc>
+                <a:spcPct val="107000"/>
+              </a:lnSpc>
+              <a:spcAft>
+                <a:spcPts val="800"/>
+              </a:spcAft>
+              <a:buNone/>
+            </a:pPr>
+            <a:endParaRPr lang="en-GB" sz="1800" kern="100" dirty="0">
+              <a:effectLst/>
+              <a:latin typeface="Calibri" panose="020F0502020204030204" pitchFamily="34" charset="0"/>
+              <a:ea typeface="Calibri" panose="020F0502020204030204" pitchFamily="34" charset="0"/>
+              <a:cs typeface="Times New Roman" panose="02020603050405020304" pitchFamily="18" charset="0"/>
+            </a:endParaRPr>
+          </a:p>
+        </p:txBody>
+      </p:sp>
+      <p:sp>
+        <p:nvSpPr>
+          <p:cNvPr id="6" name="Slide Number Placeholder 5">
+            <a:extLst>
+              <a:ext uri="{FF2B5EF4-FFF2-40B4-BE49-F238E27FC236}">
+                <a16:creationId xmlns:a16="http://schemas.microsoft.com/office/drawing/2014/main" id="{1C554D9F-1895-486E-BFBA-905BB2D29E08}"/>
+              </a:ext>
+            </a:extLst>
+          </p:cNvPr>
+          <p:cNvSpPr>
+            <a:spLocks noGrp="1"/>
+          </p:cNvSpPr>
+          <p:nvPr>
+            <p:ph type="sldNum" sz="quarter" idx="34"/>
+          </p:nvPr>
+        </p:nvSpPr>
+        <p:spPr/>
+        <p:txBody>
+          <a:bodyPr rtlCol="0"/>
+          <a:lstStyle/>
+          <a:p>
+            <a:pPr rtl="0"/>
+            <a:fld id="{19B51A1E-902D-48AF-9020-955120F399B6}" type="slidenum">
+              <a:rPr lang="en-GB" smtClean="0"/>
+              <a:pPr rtl="0"/>
+              <a:t>19</a:t>
+            </a:fld>
+            <a:endParaRPr lang="en-GB" dirty="0"/>
+          </a:p>
+        </p:txBody>
+      </p:sp>
+      <mc:AlternateContent xmlns:mc="http://schemas.openxmlformats.org/markup-compatibility/2006" xmlns:p14="http://schemas.microsoft.com/office/powerpoint/2010/main">
+        <mc:Choice Requires="p14">
+          <p:contentPart p14:bwMode="auto" r:id="rId4">
+            <p14:nvContentPartPr>
+              <p14:cNvPr id="5" name="Entrada de lápiz 4">
+                <a:extLst>
+                  <a:ext uri="{FF2B5EF4-FFF2-40B4-BE49-F238E27FC236}">
+                    <a16:creationId xmlns:a16="http://schemas.microsoft.com/office/drawing/2014/main" id="{3CD92FDC-B882-041E-73AE-4904DF8DF485}"/>
+                  </a:ext>
+                </a:extLst>
+              </p14:cNvPr>
+              <p14:cNvContentPartPr/>
+              <p14:nvPr/>
+            </p14:nvContentPartPr>
+            <p14:xfrm>
+              <a:off x="10161265" y="6358897"/>
+              <a:ext cx="1164600" cy="311760"/>
+            </p14:xfrm>
+          </p:contentPart>
+        </mc:Choice>
+        <mc:Fallback xmlns="">
+          <p:pic>
+            <p:nvPicPr>
+              <p:cNvPr id="5" name="Entrada de lápiz 4">
+                <a:extLst>
+                  <a:ext uri="{FF2B5EF4-FFF2-40B4-BE49-F238E27FC236}">
+                    <a16:creationId xmlns:a16="http://schemas.microsoft.com/office/drawing/2014/main" id="{3CD92FDC-B882-041E-73AE-4904DF8DF485}"/>
+                  </a:ext>
+                </a:extLst>
+              </p:cNvPr>
+              <p:cNvPicPr/>
+              <p:nvPr/>
+            </p:nvPicPr>
+            <p:blipFill>
+              <a:blip r:embed="rId5"/>
+              <a:stretch>
+                <a:fillRect/>
+              </a:stretch>
+            </p:blipFill>
+            <p:spPr>
+              <a:xfrm>
+                <a:off x="10098246" y="6295970"/>
+                <a:ext cx="1290279" cy="437255"/>
+              </a:xfrm>
+              <a:prstGeom prst="rect">
+                <a:avLst/>
+              </a:prstGeom>
+            </p:spPr>
+          </p:pic>
+        </mc:Fallback>
+      </mc:AlternateContent>
+      <p:pic>
+        <p:nvPicPr>
+          <p:cNvPr id="3" name="Picture 2" descr="A diagram of software development&#10;&#10;Description automatically generated">
+            <a:extLst>
+              <a:ext uri="{FF2B5EF4-FFF2-40B4-BE49-F238E27FC236}">
+                <a16:creationId xmlns:a16="http://schemas.microsoft.com/office/drawing/2014/main" id="{819B2DE1-4514-A888-3FDF-EBF105A6E2E2}"/>
+              </a:ext>
+            </a:extLst>
+          </p:cNvPr>
+          <p:cNvPicPr>
+            <a:picLocks noChangeAspect="1"/>
+          </p:cNvPicPr>
+          <p:nvPr/>
+        </p:nvPicPr>
+        <p:blipFill>
+          <a:blip r:embed="rId6"/>
+          <a:stretch>
+            <a:fillRect/>
+          </a:stretch>
+        </p:blipFill>
+        <p:spPr>
+          <a:xfrm>
+            <a:off x="1175284" y="2057491"/>
+            <a:ext cx="6743419" cy="4134509"/>
+          </a:xfrm>
+          <a:prstGeom prst="rect">
+            <a:avLst/>
+          </a:prstGeom>
+        </p:spPr>
+      </p:pic>
+    </p:spTree>
+    <p:extLst>
+      <p:ext uri="{BB962C8B-B14F-4D97-AF65-F5344CB8AC3E}">
+        <p14:creationId xmlns:p14="http://schemas.microsoft.com/office/powerpoint/2010/main" val="1728375177"/>
+      </p:ext>
+    </p:extLst>
+  </p:cSld>
+  <p:clrMapOvr>
+    <a:masterClrMapping/>
+  </p:clrMapOvr>
+</p:sld>
+</file>
+
+<file path=ppt/slides/slide2.xml><?xml version="1.0" encoding="utf-8"?>
+<p:sld xmlns:a="http://schemas.openxmlformats.org/drawingml/2006/main" xmlns:r="http://schemas.openxmlformats.org/officeDocument/2006/relationships" xmlns:p="http://schemas.openxmlformats.org/presentationml/2006/main">
+  <p:cSld>
+    <p:spTree>
+      <p:nvGrpSpPr>
+        <p:cNvPr id="1" name=""/>
+        <p:cNvGrpSpPr/>
+        <p:nvPr/>
+      </p:nvGrpSpPr>
+      <p:grpSpPr>
+        <a:xfrm>
+          <a:off x="0" y="0"/>
+          <a:ext cx="0" cy="0"/>
+          <a:chOff x="0" y="0"/>
+          <a:chExt cx="0" cy="0"/>
+        </a:xfrm>
+      </p:grpSpPr>
+      <p:pic>
+        <p:nvPicPr>
+          <p:cNvPr id="10" name="Picture Placeholder 9" descr="Abstract architecture polygon">
+            <a:extLst>
+              <a:ext uri="{FF2B5EF4-FFF2-40B4-BE49-F238E27FC236}">
+                <a16:creationId xmlns:a16="http://schemas.microsoft.com/office/drawing/2014/main" id="{38475F7B-316A-47DC-9CBB-B074A5B5994C}"/>
+              </a:ext>
+            </a:extLst>
+          </p:cNvPr>
+          <p:cNvPicPr>
+            <a:picLocks noGrp="1" noChangeAspect="1"/>
+          </p:cNvPicPr>
+          <p:nvPr>
+            <p:ph type="pic" sz="quarter" idx="33"/>
+          </p:nvPr>
+        </p:nvPicPr>
+        <p:blipFill>
+          <a:blip r:embed="rId3"/>
+          <a:srcRect l="15" r="15"/>
+          <a:stretch>
+            <a:fillRect/>
+          </a:stretch>
+        </p:blipFill>
+        <p:spPr/>
+      </p:pic>
+      <p:sp>
+        <p:nvSpPr>
+          <p:cNvPr id="2" name="Title 1">
+            <a:extLst>
+              <a:ext uri="{FF2B5EF4-FFF2-40B4-BE49-F238E27FC236}">
+                <a16:creationId xmlns:a16="http://schemas.microsoft.com/office/drawing/2014/main" id="{3560F281-4FF6-4617-A809-AC9C15ECF18A}"/>
+              </a:ext>
+            </a:extLst>
+          </p:cNvPr>
+          <p:cNvSpPr>
+            <a:spLocks noGrp="1"/>
+          </p:cNvSpPr>
+          <p:nvPr>
+            <p:ph type="title"/>
+          </p:nvPr>
+        </p:nvSpPr>
+        <p:spPr>
+          <a:xfrm>
+            <a:off x="545946" y="534878"/>
+            <a:ext cx="5184913" cy="432000"/>
+          </a:xfrm>
+        </p:spPr>
+        <p:txBody>
+          <a:bodyPr rtlCol="0"/>
+          <a:lstStyle/>
+          <a:p>
+            <a:pPr algn="l" rtl="0"/>
+            <a:r>
+              <a:rPr lang="es-ES" dirty="0"/>
+              <a:t>Objetivo</a:t>
+            </a:r>
+          </a:p>
+        </p:txBody>
+      </p:sp>
+      <p:sp>
+        <p:nvSpPr>
+          <p:cNvPr id="4" name="Content Placeholder 3">
+            <a:extLst>
+              <a:ext uri="{FF2B5EF4-FFF2-40B4-BE49-F238E27FC236}">
+                <a16:creationId xmlns:a16="http://schemas.microsoft.com/office/drawing/2014/main" id="{D355C61F-C8F1-4977-8E1F-F16C0D9EA88C}"/>
+              </a:ext>
+            </a:extLst>
+          </p:cNvPr>
+          <p:cNvSpPr>
+            <a:spLocks noGrp="1"/>
+          </p:cNvSpPr>
+          <p:nvPr>
+            <p:ph sz="half" idx="1"/>
+          </p:nvPr>
+        </p:nvSpPr>
+        <p:spPr>
+          <a:xfrm>
+            <a:off x="545946" y="1339731"/>
+            <a:ext cx="8323734" cy="2244717"/>
+          </a:xfrm>
+        </p:spPr>
+        <p:txBody>
+          <a:bodyPr rtlCol="0"/>
+          <a:lstStyle/>
+          <a:p>
+            <a:pPr marL="0" lvl="0" indent="0">
+              <a:lnSpc>
+                <a:spcPct val="107000"/>
+              </a:lnSpc>
+              <a:spcAft>
+                <a:spcPts val="800"/>
+              </a:spcAft>
+              <a:buNone/>
+            </a:pPr>
+            <a:r>
+              <a:rPr lang="es-ES" sz="1800" kern="100" dirty="0">
+                <a:effectLst/>
+                <a:latin typeface="Calibri" panose="020F0502020204030204" pitchFamily="34" charset="0"/>
+                <a:ea typeface="Calibri" panose="020F0502020204030204" pitchFamily="34" charset="0"/>
+                <a:cs typeface="Times New Roman" panose="02020603050405020304" pitchFamily="18" charset="0"/>
+              </a:rPr>
+              <a:t>Algoritmo de inversión utilizando ETFs sobre índices de varios países.</a:t>
+            </a:r>
+          </a:p>
+          <a:p>
+            <a:pPr marL="0" lvl="0" indent="0">
+              <a:lnSpc>
+                <a:spcPct val="107000"/>
+              </a:lnSpc>
+              <a:spcAft>
+                <a:spcPts val="800"/>
+              </a:spcAft>
+              <a:buNone/>
+            </a:pPr>
+            <a:r>
+              <a:rPr lang="es-ES" kern="100" dirty="0">
+                <a:latin typeface="Calibri" panose="020F0502020204030204" pitchFamily="34" charset="0"/>
+                <a:ea typeface="Calibri" panose="020F0502020204030204" pitchFamily="34" charset="0"/>
+                <a:cs typeface="Times New Roman" panose="02020603050405020304" pitchFamily="18" charset="0"/>
+              </a:rPr>
+              <a:t>R</a:t>
+            </a:r>
+            <a:r>
+              <a:rPr lang="es-ES" sz="1800" kern="100" dirty="0">
+                <a:effectLst/>
+                <a:latin typeface="Calibri" panose="020F0502020204030204" pitchFamily="34" charset="0"/>
+                <a:ea typeface="Calibri" panose="020F0502020204030204" pitchFamily="34" charset="0"/>
+                <a:cs typeface="Times New Roman" panose="02020603050405020304" pitchFamily="18" charset="0"/>
+              </a:rPr>
+              <a:t>ebalanceos mensuales dependiendo de</a:t>
+            </a:r>
+            <a:r>
+              <a:rPr lang="es-ES" kern="100" dirty="0">
+                <a:latin typeface="Calibri" panose="020F0502020204030204" pitchFamily="34" charset="0"/>
+                <a:ea typeface="Calibri" panose="020F0502020204030204" pitchFamily="34" charset="0"/>
+                <a:cs typeface="Times New Roman" panose="02020603050405020304" pitchFamily="18" charset="0"/>
+              </a:rPr>
+              <a:t> los datos macro</a:t>
+            </a:r>
+            <a:r>
+              <a:rPr lang="es-ES" sz="1800" kern="100" dirty="0">
+                <a:effectLst/>
+                <a:latin typeface="Calibri" panose="020F0502020204030204" pitchFamily="34" charset="0"/>
+                <a:ea typeface="Calibri" panose="020F0502020204030204" pitchFamily="34" charset="0"/>
+                <a:cs typeface="Times New Roman" panose="02020603050405020304" pitchFamily="18" charset="0"/>
+              </a:rPr>
+              <a:t>económicos de cada país.</a:t>
+            </a:r>
+          </a:p>
+          <a:p>
+            <a:pPr marL="0" lvl="0" indent="0">
+              <a:lnSpc>
+                <a:spcPct val="107000"/>
+              </a:lnSpc>
+              <a:spcAft>
+                <a:spcPts val="800"/>
+              </a:spcAft>
+              <a:buNone/>
+            </a:pPr>
+            <a:r>
+              <a:rPr lang="es-ES" kern="100" dirty="0">
+                <a:latin typeface="Calibri" panose="020F0502020204030204" pitchFamily="34" charset="0"/>
+                <a:ea typeface="Calibri" panose="020F0502020204030204" pitchFamily="34" charset="0"/>
+                <a:cs typeface="Times New Roman" panose="02020603050405020304" pitchFamily="18" charset="0"/>
+              </a:rPr>
+              <a:t>Batir MSCI All Country World Index (ACWI) usando los modelos de inteligencia artificial y el análisis macroeconómico.</a:t>
+            </a:r>
+          </a:p>
+          <a:p>
+            <a:pPr marL="0" lvl="0" indent="0">
+              <a:lnSpc>
+                <a:spcPct val="107000"/>
+              </a:lnSpc>
+              <a:spcAft>
+                <a:spcPts val="800"/>
+              </a:spcAft>
+              <a:buNone/>
+            </a:pPr>
+            <a:endParaRPr lang="es-ES" sz="1800" kern="100" dirty="0">
+              <a:effectLst/>
+              <a:latin typeface="Calibri" panose="020F0502020204030204" pitchFamily="34" charset="0"/>
+              <a:ea typeface="Calibri" panose="020F0502020204030204" pitchFamily="34" charset="0"/>
+              <a:cs typeface="Times New Roman" panose="02020603050405020304" pitchFamily="18" charset="0"/>
+            </a:endParaRPr>
+          </a:p>
+          <a:p>
+            <a:pPr marL="0" lvl="0" indent="0">
+              <a:lnSpc>
+                <a:spcPct val="107000"/>
+              </a:lnSpc>
+              <a:spcAft>
+                <a:spcPts val="800"/>
+              </a:spcAft>
+              <a:buNone/>
+            </a:pPr>
+            <a:endParaRPr lang="en-GB" sz="1800" kern="100" dirty="0">
+              <a:effectLst/>
+              <a:latin typeface="Calibri" panose="020F0502020204030204" pitchFamily="34" charset="0"/>
+              <a:ea typeface="Calibri" panose="020F0502020204030204" pitchFamily="34" charset="0"/>
+              <a:cs typeface="Times New Roman" panose="02020603050405020304" pitchFamily="18" charset="0"/>
+            </a:endParaRPr>
+          </a:p>
+        </p:txBody>
+      </p:sp>
+      <p:sp>
+        <p:nvSpPr>
+          <p:cNvPr id="6" name="Slide Number Placeholder 5">
+            <a:extLst>
+              <a:ext uri="{FF2B5EF4-FFF2-40B4-BE49-F238E27FC236}">
+                <a16:creationId xmlns:a16="http://schemas.microsoft.com/office/drawing/2014/main" id="{1C554D9F-1895-486E-BFBA-905BB2D29E08}"/>
+              </a:ext>
+            </a:extLst>
+          </p:cNvPr>
+          <p:cNvSpPr>
+            <a:spLocks noGrp="1"/>
+          </p:cNvSpPr>
+          <p:nvPr>
+            <p:ph type="sldNum" sz="quarter" idx="34"/>
+          </p:nvPr>
+        </p:nvSpPr>
+        <p:spPr/>
+        <p:txBody>
+          <a:bodyPr rtlCol="0"/>
+          <a:lstStyle/>
+          <a:p>
+            <a:pPr rtl="0"/>
+            <a:fld id="{19B51A1E-902D-48AF-9020-955120F399B6}" type="slidenum">
+              <a:rPr lang="en-GB" smtClean="0"/>
+              <a:pPr rtl="0"/>
+              <a:t>2</a:t>
+            </a:fld>
+            <a:endParaRPr lang="en-GB" dirty="0"/>
+          </a:p>
+        </p:txBody>
+      </p:sp>
+      <mc:AlternateContent xmlns:mc="http://schemas.openxmlformats.org/markup-compatibility/2006" xmlns:p14="http://schemas.microsoft.com/office/powerpoint/2010/main">
+        <mc:Choice Requires="p14">
+          <p:contentPart p14:bwMode="auto" r:id="rId4">
+            <p14:nvContentPartPr>
+              <p14:cNvPr id="5" name="Entrada de lápiz 4">
+                <a:extLst>
+                  <a:ext uri="{FF2B5EF4-FFF2-40B4-BE49-F238E27FC236}">
+                    <a16:creationId xmlns:a16="http://schemas.microsoft.com/office/drawing/2014/main" id="{3CD92FDC-B882-041E-73AE-4904DF8DF485}"/>
+                  </a:ext>
+                </a:extLst>
+              </p14:cNvPr>
+              <p14:cNvContentPartPr/>
+              <p14:nvPr/>
+            </p14:nvContentPartPr>
+            <p14:xfrm>
+              <a:off x="10161265" y="6358897"/>
+              <a:ext cx="1164600" cy="311760"/>
+            </p14:xfrm>
+          </p:contentPart>
+        </mc:Choice>
+        <mc:Fallback xmlns="">
+          <p:pic>
+            <p:nvPicPr>
+              <p:cNvPr id="5" name="Entrada de lápiz 4">
+                <a:extLst>
+                  <a:ext uri="{FF2B5EF4-FFF2-40B4-BE49-F238E27FC236}">
+                    <a16:creationId xmlns:a16="http://schemas.microsoft.com/office/drawing/2014/main" id="{3CD92FDC-B882-041E-73AE-4904DF8DF485}"/>
+                  </a:ext>
+                </a:extLst>
+              </p:cNvPr>
+              <p:cNvPicPr/>
+              <p:nvPr/>
+            </p:nvPicPr>
+            <p:blipFill>
+              <a:blip r:embed="rId5"/>
+              <a:stretch>
+                <a:fillRect/>
+              </a:stretch>
+            </p:blipFill>
+            <p:spPr>
+              <a:xfrm>
+                <a:off x="10098625" y="6295897"/>
+                <a:ext cx="1290240" cy="437400"/>
+              </a:xfrm>
+              <a:prstGeom prst="rect">
+                <a:avLst/>
+              </a:prstGeom>
+            </p:spPr>
+          </p:pic>
+        </mc:Fallback>
+      </mc:AlternateContent>
+    </p:spTree>
+    <p:extLst>
+      <p:ext uri="{BB962C8B-B14F-4D97-AF65-F5344CB8AC3E}">
+        <p14:creationId xmlns:p14="http://schemas.microsoft.com/office/powerpoint/2010/main" val="2350990585"/>
+      </p:ext>
+    </p:extLst>
+  </p:cSld>
+  <p:clrMapOvr>
+    <a:masterClrMapping/>
+  </p:clrMapOvr>
+  <p:timing>
+    <p:tnLst>
+      <p:par>
+        <p:cTn id="1" dur="indefinite" restart="never" nodeType="tmRoot">
+          <p:childTnLst>
+            <p:seq concurrent="1" nextAc="seek">
+              <p:cTn id="2" dur="indefinite" nodeType="mainSeq">
+                <p:childTnLst>
+                  <p:par>
+                    <p:cTn id="3" fill="hold">
+                      <p:stCondLst>
+                        <p:cond delay="indefinite"/>
+                      </p:stCondLst>
+                      <p:childTnLst>
+                        <p:par>
+                          <p:cTn id="4" fill="hold">
+                            <p:stCondLst>
+                              <p:cond delay="0"/>
+                            </p:stCondLst>
+                            <p:childTnLst>
+                              <p:par>
+                                <p:cTn id="5" presetID="1" presetClass="entr" presetSubtype="0" fill="hold" grpId="0" nodeType="clickEffect">
+                                  <p:stCondLst>
+                                    <p:cond delay="0"/>
+                                  </p:stCondLst>
+                                  <p:childTnLst>
+                                    <p:set>
+                                      <p:cBhvr>
+                                        <p:cTn id="6" dur="1" fill="hold">
+                                          <p:stCondLst>
+                                            <p:cond delay="0"/>
+                                          </p:stCondLst>
+                                        </p:cTn>
+                                        <p:tgtEl>
+                                          <p:spTgt spid="4">
+                                            <p:txEl>
+                                              <p:pRg st="1" end="1"/>
+                                            </p:txEl>
+                                          </p:spTgt>
+                                        </p:tgtEl>
+                                        <p:attrNameLst>
+                                          <p:attrName>style.visibility</p:attrName>
+                                        </p:attrNameLst>
+                                      </p:cBhvr>
+                                      <p:to>
+                                        <p:strVal val="visible"/>
+                                      </p:to>
+                                    </p:set>
+                                  </p:childTnLst>
+                                </p:cTn>
+                              </p:par>
+                            </p:childTnLst>
+                          </p:cTn>
+                        </p:par>
+                      </p:childTnLst>
+                    </p:cTn>
+                  </p:par>
+                  <p:par>
+                    <p:cTn id="7" fill="hold">
+                      <p:stCondLst>
+                        <p:cond delay="indefinite"/>
+                      </p:stCondLst>
+                      <p:childTnLst>
+                        <p:par>
+                          <p:cTn id="8" fill="hold">
+                            <p:stCondLst>
+                              <p:cond delay="0"/>
+                            </p:stCondLst>
+                            <p:childTnLst>
+                              <p:par>
+                                <p:cTn id="9" presetID="1" presetClass="entr" presetSubtype="0" fill="hold" grpId="0" nodeType="clickEffect">
+                                  <p:stCondLst>
+                                    <p:cond delay="0"/>
+                                  </p:stCondLst>
+                                  <p:childTnLst>
+                                    <p:set>
+                                      <p:cBhvr>
+                                        <p:cTn id="10" dur="1" fill="hold">
+                                          <p:stCondLst>
+                                            <p:cond delay="0"/>
+                                          </p:stCondLst>
+                                        </p:cTn>
+                                        <p:tgtEl>
+                                          <p:spTgt spid="4">
+                                            <p:txEl>
+                                              <p:pRg st="2" end="2"/>
+                                            </p:txEl>
+                                          </p:spTgt>
+                                        </p:tgtEl>
+                                        <p:attrNameLst>
+                                          <p:attrName>style.visibility</p:attrName>
+                                        </p:attrNameLst>
+                                      </p:cBhvr>
+                                      <p:to>
+                                        <p:strVal val="visible"/>
+                                      </p:to>
+                                    </p:set>
+                                  </p:childTnLst>
+                                </p:cTn>
+                              </p:par>
+                            </p:childTnLst>
+                          </p:cTn>
+                        </p:par>
+                      </p:childTnLst>
+                    </p:cTn>
+                  </p:par>
+                </p:childTnLst>
+              </p:cTn>
+              <p:prevCondLst>
+                <p:cond evt="onPrev" delay="0">
+                  <p:tgtEl>
+                    <p:sldTgt/>
+                  </p:tgtEl>
+                </p:cond>
+              </p:prevCondLst>
+              <p:nextCondLst>
+                <p:cond evt="onNext" delay="0">
+                  <p:tgtEl>
+                    <p:sldTgt/>
+                  </p:tgtEl>
+                </p:cond>
+              </p:nextCondLst>
+            </p:seq>
+          </p:childTnLst>
+        </p:cTn>
+      </p:par>
+    </p:tnLst>
+    <p:bldLst>
+      <p:bldP spid="4" grpId="0" uiExpand="1" build="p"/>
+    </p:bldLst>
+  </p:timing>
+</p:sld>
+</file>
+
+<file path=ppt/slides/slide20.xml><?xml version="1.0" encoding="utf-8"?>
+<p:sld xmlns:a="http://schemas.openxmlformats.org/drawingml/2006/main" xmlns:r="http://schemas.openxmlformats.org/officeDocument/2006/relationships" xmlns:p="http://schemas.openxmlformats.org/presentationml/2006/main">
+  <p:cSld>
+    <p:spTree>
+      <p:nvGrpSpPr>
+        <p:cNvPr id="1" name=""/>
+        <p:cNvGrpSpPr/>
+        <p:nvPr/>
+      </p:nvGrpSpPr>
+      <p:grpSpPr>
+        <a:xfrm>
+          <a:off x="0" y="0"/>
+          <a:ext cx="0" cy="0"/>
+          <a:chOff x="0" y="0"/>
+          <a:chExt cx="0" cy="0"/>
+        </a:xfrm>
+      </p:grpSpPr>
+      <p:pic>
+        <p:nvPicPr>
+          <p:cNvPr id="10" name="Picture Placeholder 9" descr="Abstract architecture polygon">
+            <a:extLst>
+              <a:ext uri="{FF2B5EF4-FFF2-40B4-BE49-F238E27FC236}">
+                <a16:creationId xmlns:a16="http://schemas.microsoft.com/office/drawing/2014/main" id="{38475F7B-316A-47DC-9CBB-B074A5B5994C}"/>
+              </a:ext>
+            </a:extLst>
+          </p:cNvPr>
+          <p:cNvPicPr>
+            <a:picLocks noGrp="1" noChangeAspect="1"/>
+          </p:cNvPicPr>
+          <p:nvPr>
+            <p:ph type="pic" sz="quarter" idx="33"/>
+          </p:nvPr>
+        </p:nvPicPr>
+        <p:blipFill>
+          <a:blip r:embed="rId3"/>
+          <a:srcRect l="15" r="15"/>
+          <a:stretch>
+            <a:fillRect/>
+          </a:stretch>
+        </p:blipFill>
+        <p:spPr/>
+      </p:pic>
+      <p:sp>
+        <p:nvSpPr>
+          <p:cNvPr id="2" name="Title 1">
+            <a:extLst>
+              <a:ext uri="{FF2B5EF4-FFF2-40B4-BE49-F238E27FC236}">
+                <a16:creationId xmlns:a16="http://schemas.microsoft.com/office/drawing/2014/main" id="{3560F281-4FF6-4617-A809-AC9C15ECF18A}"/>
+              </a:ext>
+            </a:extLst>
+          </p:cNvPr>
+          <p:cNvSpPr>
+            <a:spLocks noGrp="1"/>
+          </p:cNvSpPr>
+          <p:nvPr>
+            <p:ph type="title"/>
+          </p:nvPr>
+        </p:nvSpPr>
+        <p:spPr>
+          <a:xfrm>
+            <a:off x="545946" y="534878"/>
             <a:ext cx="7500774" cy="432000"/>
           </a:xfrm>
         </p:spPr>
@@ -17250,14 +18455,14 @@
             <a:fld id="{19B51A1E-902D-48AF-9020-955120F399B6}" type="slidenum">
               <a:rPr lang="en-GB" smtClean="0"/>
               <a:pPr rtl="0"/>
-              <a:t>19</a:t>
+              <a:t>20</a:t>
             </a:fld>
             <a:endParaRPr lang="en-GB" dirty="0"/>
           </a:p>
         </p:txBody>
       </p:sp>
-      <mc:AlternateContent xmlns:mc="http://schemas.openxmlformats.org/markup-compatibility/2006">
-        <mc:Choice xmlns:p14="http://schemas.microsoft.com/office/powerpoint/2010/main" Requires="p14">
+      <mc:AlternateContent xmlns:mc="http://schemas.openxmlformats.org/markup-compatibility/2006" xmlns:p14="http://schemas.microsoft.com/office/powerpoint/2010/main">
+        <mc:Choice Requires="p14">
           <p:contentPart p14:bwMode="auto" r:id="rId4">
             <p14:nvContentPartPr>
               <p14:cNvPr id="5" name="Entrada de lápiz 4">
@@ -17276,7 +18481,7 @@
             </p14:xfrm>
           </p:contentPart>
         </mc:Choice>
-        <mc:Fallback>
+        <mc:Fallback xmlns="">
           <p:pic>
             <p:nvPicPr>
               <p:cNvPr id="5" name="Entrada de lápiz 4">
@@ -17625,377 +18830,7 @@
 </p:sld>
 </file>
 
-<file path=ppt/slides/slide2.xml><?xml version="1.0" encoding="utf-8"?>
-<p:sld xmlns:a="http://schemas.openxmlformats.org/drawingml/2006/main" xmlns:r="http://schemas.openxmlformats.org/officeDocument/2006/relationships" xmlns:p="http://schemas.openxmlformats.org/presentationml/2006/main">
-  <p:cSld>
-    <p:spTree>
-      <p:nvGrpSpPr>
-        <p:cNvPr id="1" name=""/>
-        <p:cNvGrpSpPr/>
-        <p:nvPr/>
-      </p:nvGrpSpPr>
-      <p:grpSpPr>
-        <a:xfrm>
-          <a:off x="0" y="0"/>
-          <a:ext cx="0" cy="0"/>
-          <a:chOff x="0" y="0"/>
-          <a:chExt cx="0" cy="0"/>
-        </a:xfrm>
-      </p:grpSpPr>
-      <p:pic>
-        <p:nvPicPr>
-          <p:cNvPr id="10" name="Picture Placeholder 9" descr="Abstract architecture polygon">
-            <a:extLst>
-              <a:ext uri="{FF2B5EF4-FFF2-40B4-BE49-F238E27FC236}">
-                <a16:creationId xmlns:a16="http://schemas.microsoft.com/office/drawing/2014/main" id="{38475F7B-316A-47DC-9CBB-B074A5B5994C}"/>
-              </a:ext>
-            </a:extLst>
-          </p:cNvPr>
-          <p:cNvPicPr>
-            <a:picLocks noGrp="1" noChangeAspect="1"/>
-          </p:cNvPicPr>
-          <p:nvPr>
-            <p:ph type="pic" sz="quarter" idx="33"/>
-          </p:nvPr>
-        </p:nvPicPr>
-        <p:blipFill>
-          <a:blip r:embed="rId3"/>
-          <a:srcRect l="15" r="15"/>
-          <a:stretch>
-            <a:fillRect/>
-          </a:stretch>
-        </p:blipFill>
-        <p:spPr/>
-      </p:pic>
-      <p:sp>
-        <p:nvSpPr>
-          <p:cNvPr id="2" name="Title 1">
-            <a:extLst>
-              <a:ext uri="{FF2B5EF4-FFF2-40B4-BE49-F238E27FC236}">
-                <a16:creationId xmlns:a16="http://schemas.microsoft.com/office/drawing/2014/main" id="{3560F281-4FF6-4617-A809-AC9C15ECF18A}"/>
-              </a:ext>
-            </a:extLst>
-          </p:cNvPr>
-          <p:cNvSpPr>
-            <a:spLocks noGrp="1"/>
-          </p:cNvSpPr>
-          <p:nvPr>
-            <p:ph type="title"/>
-          </p:nvPr>
-        </p:nvSpPr>
-        <p:spPr>
-          <a:xfrm>
-            <a:off x="545946" y="534878"/>
-            <a:ext cx="5184913" cy="432000"/>
-          </a:xfrm>
-        </p:spPr>
-        <p:txBody>
-          <a:bodyPr rtlCol="0"/>
-          <a:lstStyle/>
-          <a:p>
-            <a:pPr algn="l" rtl="0"/>
-            <a:r>
-              <a:rPr lang="es-ES" dirty="0"/>
-              <a:t>Objetivo</a:t>
-            </a:r>
-          </a:p>
-        </p:txBody>
-      </p:sp>
-      <p:sp>
-        <p:nvSpPr>
-          <p:cNvPr id="4" name="Content Placeholder 3">
-            <a:extLst>
-              <a:ext uri="{FF2B5EF4-FFF2-40B4-BE49-F238E27FC236}">
-                <a16:creationId xmlns:a16="http://schemas.microsoft.com/office/drawing/2014/main" id="{D355C61F-C8F1-4977-8E1F-F16C0D9EA88C}"/>
-              </a:ext>
-            </a:extLst>
-          </p:cNvPr>
-          <p:cNvSpPr>
-            <a:spLocks noGrp="1"/>
-          </p:cNvSpPr>
-          <p:nvPr>
-            <p:ph sz="half" idx="1"/>
-          </p:nvPr>
-        </p:nvSpPr>
-        <p:spPr>
-          <a:xfrm>
-            <a:off x="545946" y="1339731"/>
-            <a:ext cx="8323734" cy="2244717"/>
-          </a:xfrm>
-        </p:spPr>
-        <p:txBody>
-          <a:bodyPr rtlCol="0"/>
-          <a:lstStyle/>
-          <a:p>
-            <a:pPr marL="0" lvl="0" indent="0">
-              <a:lnSpc>
-                <a:spcPct val="107000"/>
-              </a:lnSpc>
-              <a:spcAft>
-                <a:spcPts val="800"/>
-              </a:spcAft>
-              <a:buNone/>
-            </a:pPr>
-            <a:r>
-              <a:rPr lang="es-ES" sz="1800" kern="100" dirty="0">
-                <a:effectLst/>
-                <a:latin typeface="Calibri" panose="020F0502020204030204" pitchFamily="34" charset="0"/>
-                <a:ea typeface="Calibri" panose="020F0502020204030204" pitchFamily="34" charset="0"/>
-                <a:cs typeface="Times New Roman" panose="02020603050405020304" pitchFamily="18" charset="0"/>
-              </a:rPr>
-              <a:t>Diseñar un algoritmo de inversión utilizando ETFs sobre índices de varios países y rebalancearlo dependiendo de</a:t>
-            </a:r>
-            <a:r>
-              <a:rPr lang="es-ES" kern="100" dirty="0">
-                <a:latin typeface="Calibri" panose="020F0502020204030204" pitchFamily="34" charset="0"/>
-                <a:ea typeface="Calibri" panose="020F0502020204030204" pitchFamily="34" charset="0"/>
-                <a:cs typeface="Times New Roman" panose="02020603050405020304" pitchFamily="18" charset="0"/>
-              </a:rPr>
-              <a:t> los datos macro</a:t>
-            </a:r>
-            <a:r>
-              <a:rPr lang="es-ES" sz="1800" kern="100" dirty="0">
-                <a:effectLst/>
-                <a:latin typeface="Calibri" panose="020F0502020204030204" pitchFamily="34" charset="0"/>
-                <a:ea typeface="Calibri" panose="020F0502020204030204" pitchFamily="34" charset="0"/>
-                <a:cs typeface="Times New Roman" panose="02020603050405020304" pitchFamily="18" charset="0"/>
-              </a:rPr>
-              <a:t>económicos de cada país.</a:t>
-            </a:r>
-          </a:p>
-          <a:p>
-            <a:pPr marL="0" lvl="0" indent="0">
-              <a:lnSpc>
-                <a:spcPct val="107000"/>
-              </a:lnSpc>
-              <a:spcAft>
-                <a:spcPts val="800"/>
-              </a:spcAft>
-              <a:buNone/>
-            </a:pPr>
-            <a:r>
-              <a:rPr lang="es-ES" kern="100" dirty="0">
-                <a:latin typeface="Calibri" panose="020F0502020204030204" pitchFamily="34" charset="0"/>
-                <a:ea typeface="Calibri" panose="020F0502020204030204" pitchFamily="34" charset="0"/>
-                <a:cs typeface="Times New Roman" panose="02020603050405020304" pitchFamily="18" charset="0"/>
-              </a:rPr>
-              <a:t>Mejorar el rendimiento de gestión pasiva basada en índices globales como MSCI All Country World Index (ACWI) usando los modelos de inteligencia artificial y el análisis macroeconómico.</a:t>
-            </a:r>
-          </a:p>
-          <a:p>
-            <a:pPr marL="0" lvl="0" indent="0">
-              <a:lnSpc>
-                <a:spcPct val="107000"/>
-              </a:lnSpc>
-              <a:spcAft>
-                <a:spcPts val="800"/>
-              </a:spcAft>
-              <a:buNone/>
-            </a:pPr>
-            <a:endParaRPr lang="es-ES" sz="1800" kern="100" dirty="0">
-              <a:effectLst/>
-              <a:latin typeface="Calibri" panose="020F0502020204030204" pitchFamily="34" charset="0"/>
-              <a:ea typeface="Calibri" panose="020F0502020204030204" pitchFamily="34" charset="0"/>
-              <a:cs typeface="Times New Roman" panose="02020603050405020304" pitchFamily="18" charset="0"/>
-            </a:endParaRPr>
-          </a:p>
-          <a:p>
-            <a:pPr marL="0" lvl="0" indent="0">
-              <a:lnSpc>
-                <a:spcPct val="107000"/>
-              </a:lnSpc>
-              <a:spcAft>
-                <a:spcPts val="800"/>
-              </a:spcAft>
-              <a:buNone/>
-            </a:pPr>
-            <a:endParaRPr lang="en-GB" sz="1800" kern="100" dirty="0">
-              <a:effectLst/>
-              <a:latin typeface="Calibri" panose="020F0502020204030204" pitchFamily="34" charset="0"/>
-              <a:ea typeface="Calibri" panose="020F0502020204030204" pitchFamily="34" charset="0"/>
-              <a:cs typeface="Times New Roman" panose="02020603050405020304" pitchFamily="18" charset="0"/>
-            </a:endParaRPr>
-          </a:p>
-        </p:txBody>
-      </p:sp>
-      <p:sp>
-        <p:nvSpPr>
-          <p:cNvPr id="6" name="Slide Number Placeholder 5">
-            <a:extLst>
-              <a:ext uri="{FF2B5EF4-FFF2-40B4-BE49-F238E27FC236}">
-                <a16:creationId xmlns:a16="http://schemas.microsoft.com/office/drawing/2014/main" id="{1C554D9F-1895-486E-BFBA-905BB2D29E08}"/>
-              </a:ext>
-            </a:extLst>
-          </p:cNvPr>
-          <p:cNvSpPr>
-            <a:spLocks noGrp="1"/>
-          </p:cNvSpPr>
-          <p:nvPr>
-            <p:ph type="sldNum" sz="quarter" idx="34"/>
-          </p:nvPr>
-        </p:nvSpPr>
-        <p:spPr/>
-        <p:txBody>
-          <a:bodyPr rtlCol="0"/>
-          <a:lstStyle/>
-          <a:p>
-            <a:pPr rtl="0"/>
-            <a:fld id="{19B51A1E-902D-48AF-9020-955120F399B6}" type="slidenum">
-              <a:rPr lang="en-GB" smtClean="0"/>
-              <a:pPr rtl="0"/>
-              <a:t>2</a:t>
-            </a:fld>
-            <a:endParaRPr lang="en-GB" dirty="0"/>
-          </a:p>
-        </p:txBody>
-      </p:sp>
-      <mc:AlternateContent xmlns:mc="http://schemas.openxmlformats.org/markup-compatibility/2006" xmlns:p14="http://schemas.microsoft.com/office/powerpoint/2010/main">
-        <mc:Choice Requires="p14">
-          <p:contentPart p14:bwMode="auto" r:id="rId4">
-            <p14:nvContentPartPr>
-              <p14:cNvPr id="5" name="Entrada de lápiz 4">
-                <a:extLst>
-                  <a:ext uri="{FF2B5EF4-FFF2-40B4-BE49-F238E27FC236}">
-                    <a16:creationId xmlns:a16="http://schemas.microsoft.com/office/drawing/2014/main" id="{3CD92FDC-B882-041E-73AE-4904DF8DF485}"/>
-                  </a:ext>
-                </a:extLst>
-              </p14:cNvPr>
-              <p14:cNvContentPartPr/>
-              <p14:nvPr/>
-            </p14:nvContentPartPr>
-            <p14:xfrm>
-              <a:off x="10161265" y="6358897"/>
-              <a:ext cx="1164600" cy="311760"/>
-            </p14:xfrm>
-          </p:contentPart>
-        </mc:Choice>
-        <mc:Fallback xmlns="">
-          <p:pic>
-            <p:nvPicPr>
-              <p:cNvPr id="5" name="Entrada de lápiz 4">
-                <a:extLst>
-                  <a:ext uri="{FF2B5EF4-FFF2-40B4-BE49-F238E27FC236}">
-                    <a16:creationId xmlns:a16="http://schemas.microsoft.com/office/drawing/2014/main" id="{3CD92FDC-B882-041E-73AE-4904DF8DF485}"/>
-                  </a:ext>
-                </a:extLst>
-              </p:cNvPr>
-              <p:cNvPicPr/>
-              <p:nvPr/>
-            </p:nvPicPr>
-            <p:blipFill>
-              <a:blip r:embed="rId5"/>
-              <a:stretch>
-                <a:fillRect/>
-              </a:stretch>
-            </p:blipFill>
-            <p:spPr>
-              <a:xfrm>
-                <a:off x="10098625" y="6295897"/>
-                <a:ext cx="1290240" cy="437400"/>
-              </a:xfrm>
-              <a:prstGeom prst="rect">
-                <a:avLst/>
-              </a:prstGeom>
-            </p:spPr>
-          </p:pic>
-        </mc:Fallback>
-      </mc:AlternateContent>
-    </p:spTree>
-    <p:extLst>
-      <p:ext uri="{BB962C8B-B14F-4D97-AF65-F5344CB8AC3E}">
-        <p14:creationId xmlns:p14="http://schemas.microsoft.com/office/powerpoint/2010/main" val="2350990585"/>
-      </p:ext>
-    </p:extLst>
-  </p:cSld>
-  <p:clrMapOvr>
-    <a:masterClrMapping/>
-  </p:clrMapOvr>
-  <p:timing>
-    <p:tnLst>
-      <p:par>
-        <p:cTn id="1" dur="indefinite" restart="never" nodeType="tmRoot">
-          <p:childTnLst>
-            <p:seq concurrent="1" nextAc="seek">
-              <p:cTn id="2" dur="indefinite" nodeType="mainSeq">
-                <p:childTnLst>
-                  <p:par>
-                    <p:cTn id="3" fill="hold">
-                      <p:stCondLst>
-                        <p:cond delay="indefinite"/>
-                      </p:stCondLst>
-                      <p:childTnLst>
-                        <p:par>
-                          <p:cTn id="4" fill="hold">
-                            <p:stCondLst>
-                              <p:cond delay="0"/>
-                            </p:stCondLst>
-                            <p:childTnLst>
-                              <p:par>
-                                <p:cTn id="5" presetID="1" presetClass="entr" presetSubtype="0" fill="hold" grpId="0" nodeType="clickEffect">
-                                  <p:stCondLst>
-                                    <p:cond delay="0"/>
-                                  </p:stCondLst>
-                                  <p:childTnLst>
-                                    <p:set>
-                                      <p:cBhvr>
-                                        <p:cTn id="6" dur="1" fill="hold">
-                                          <p:stCondLst>
-                                            <p:cond delay="0"/>
-                                          </p:stCondLst>
-                                        </p:cTn>
-                                        <p:tgtEl>
-                                          <p:spTgt spid="4">
-                                            <p:txEl>
-                                              <p:pRg st="1" end="1"/>
-                                            </p:txEl>
-                                          </p:spTgt>
-                                        </p:tgtEl>
-                                        <p:attrNameLst>
-                                          <p:attrName>style.visibility</p:attrName>
-                                        </p:attrNameLst>
-                                      </p:cBhvr>
-                                      <p:to>
-                                        <p:strVal val="visible"/>
-                                      </p:to>
-                                    </p:set>
-                                  </p:childTnLst>
-                                </p:cTn>
-                              </p:par>
-                            </p:childTnLst>
-                          </p:cTn>
-                        </p:par>
-                      </p:childTnLst>
-                    </p:cTn>
-                  </p:par>
-                </p:childTnLst>
-              </p:cTn>
-              <p:prevCondLst>
-                <p:cond evt="onPrev" delay="0">
-                  <p:tgtEl>
-                    <p:sldTgt/>
-                  </p:tgtEl>
-                </p:cond>
-              </p:prevCondLst>
-              <p:nextCondLst>
-                <p:cond evt="onNext" delay="0">
-                  <p:tgtEl>
-                    <p:sldTgt/>
-                  </p:tgtEl>
-                </p:cond>
-              </p:nextCondLst>
-            </p:seq>
-          </p:childTnLst>
-        </p:cTn>
-      </p:par>
-    </p:tnLst>
-    <p:bldLst>
-      <p:bldP spid="4" grpId="0" uiExpand="1" build="p"/>
-    </p:bldLst>
-  </p:timing>
-</p:sld>
-</file>
-
-<file path=ppt/slides/slide20.xml><?xml version="1.0" encoding="utf-8"?>
+<file path=ppt/slides/slide21.xml><?xml version="1.0" encoding="utf-8"?>
 <p:sld xmlns:a="http://schemas.openxmlformats.org/drawingml/2006/main" xmlns:r="http://schemas.openxmlformats.org/officeDocument/2006/relationships" xmlns:p="http://schemas.openxmlformats.org/presentationml/2006/main">
   <p:cSld>
     <p:spTree>
@@ -18266,14 +19101,14 @@
             <a:fld id="{19B51A1E-902D-48AF-9020-955120F399B6}" type="slidenum">
               <a:rPr lang="en-GB" smtClean="0"/>
               <a:pPr rtl="0"/>
-              <a:t>20</a:t>
+              <a:t>21</a:t>
             </a:fld>
             <a:endParaRPr lang="en-GB" dirty="0"/>
           </a:p>
         </p:txBody>
       </p:sp>
-      <mc:AlternateContent xmlns:mc="http://schemas.openxmlformats.org/markup-compatibility/2006">
-        <mc:Choice xmlns:p14="http://schemas.microsoft.com/office/powerpoint/2010/main" Requires="p14">
+      <mc:AlternateContent xmlns:mc="http://schemas.openxmlformats.org/markup-compatibility/2006" xmlns:p14="http://schemas.microsoft.com/office/powerpoint/2010/main">
+        <mc:Choice Requires="p14">
           <p:contentPart p14:bwMode="auto" r:id="rId4">
             <p14:nvContentPartPr>
               <p14:cNvPr id="5" name="Entrada de lápiz 4">
@@ -18292,7 +19127,7 @@
             </p14:xfrm>
           </p:contentPart>
         </mc:Choice>
-        <mc:Fallback>
+        <mc:Fallback xmlns="">
           <p:pic>
             <p:nvPicPr>
               <p:cNvPr id="5" name="Entrada de lápiz 4">
@@ -18874,8 +19709,8 @@
           </a:p>
         </p:txBody>
       </p:sp>
-      <mc:AlternateContent xmlns:mc="http://schemas.openxmlformats.org/markup-compatibility/2006">
-        <mc:Choice xmlns:p14="http://schemas.microsoft.com/office/powerpoint/2010/main" Requires="p14">
+      <mc:AlternateContent xmlns:mc="http://schemas.openxmlformats.org/markup-compatibility/2006" xmlns:p14="http://schemas.microsoft.com/office/powerpoint/2010/main">
+        <mc:Choice Requires="p14">
           <p:contentPart p14:bwMode="auto" r:id="rId4">
             <p14:nvContentPartPr>
               <p14:cNvPr id="5" name="Entrada de lápiz 4">
@@ -18894,7 +19729,7 @@
             </p14:xfrm>
           </p:contentPart>
         </mc:Choice>
-        <mc:Fallback>
+        <mc:Fallback xmlns="">
           <p:pic>
             <p:nvPicPr>
               <p:cNvPr id="5" name="Entrada de lápiz 4">
@@ -19550,8 +20385,8 @@
           </a:p>
         </p:txBody>
       </p:sp>
-      <mc:AlternateContent xmlns:mc="http://schemas.openxmlformats.org/markup-compatibility/2006">
-        <mc:Choice xmlns:p14="http://schemas.microsoft.com/office/powerpoint/2010/main" Requires="p14">
+      <mc:AlternateContent xmlns:mc="http://schemas.openxmlformats.org/markup-compatibility/2006" xmlns:p14="http://schemas.microsoft.com/office/powerpoint/2010/main">
+        <mc:Choice Requires="p14">
           <p:contentPart p14:bwMode="auto" r:id="rId4">
             <p14:nvContentPartPr>
               <p14:cNvPr id="5" name="Entrada de lápiz 4">
@@ -19570,7 +20405,7 @@
             </p14:xfrm>
           </p:contentPart>
         </mc:Choice>
-        <mc:Fallback>
+        <mc:Fallback xmlns="">
           <p:pic>
             <p:nvPicPr>
               <p:cNvPr id="5" name="Entrada de lápiz 4">
@@ -20193,8 +21028,8 @@
           </a:p>
         </p:txBody>
       </p:sp>
-      <mc:AlternateContent xmlns:mc="http://schemas.openxmlformats.org/markup-compatibility/2006">
-        <mc:Choice xmlns:p14="http://schemas.microsoft.com/office/powerpoint/2010/main" Requires="p14">
+      <mc:AlternateContent xmlns:mc="http://schemas.openxmlformats.org/markup-compatibility/2006" xmlns:p14="http://schemas.microsoft.com/office/powerpoint/2010/main">
+        <mc:Choice Requires="p14">
           <p:contentPart p14:bwMode="auto" r:id="rId4">
             <p14:nvContentPartPr>
               <p14:cNvPr id="5" name="Entrada de lápiz 4">
@@ -20213,7 +21048,7 @@
             </p14:xfrm>
           </p:contentPart>
         </mc:Choice>
-        <mc:Fallback>
+        <mc:Fallback xmlns="">
           <p:pic>
             <p:nvPicPr>
               <p:cNvPr id="5" name="Entrada de lápiz 4">
@@ -27685,8 +28520,8 @@
           </a:p>
         </p:txBody>
       </p:sp>
-      <mc:AlternateContent xmlns:mc="http://schemas.openxmlformats.org/markup-compatibility/2006">
-        <mc:Choice xmlns:p14="http://schemas.microsoft.com/office/powerpoint/2010/main" Requires="p14">
+      <mc:AlternateContent xmlns:mc="http://schemas.openxmlformats.org/markup-compatibility/2006" xmlns:p14="http://schemas.microsoft.com/office/powerpoint/2010/main">
+        <mc:Choice Requires="p14">
           <p:contentPart p14:bwMode="auto" r:id="rId4">
             <p14:nvContentPartPr>
               <p14:cNvPr id="5" name="Entrada de lápiz 4">
@@ -27705,7 +28540,7 @@
             </p14:xfrm>
           </p:contentPart>
         </mc:Choice>
-        <mc:Fallback>
+        <mc:Fallback xmlns="">
           <p:pic>
             <p:nvPicPr>
               <p:cNvPr id="5" name="Entrada de lápiz 4">
@@ -27856,8 +28691,8 @@
           </a:p>
         </p:txBody>
       </p:sp>
-      <mc:AlternateContent xmlns:mc="http://schemas.openxmlformats.org/markup-compatibility/2006">
-        <mc:Choice xmlns:p14="http://schemas.microsoft.com/office/powerpoint/2010/main" Requires="p14">
+      <mc:AlternateContent xmlns:mc="http://schemas.openxmlformats.org/markup-compatibility/2006" xmlns:p14="http://schemas.microsoft.com/office/powerpoint/2010/main">
+        <mc:Choice Requires="p14">
           <p:contentPart p14:bwMode="auto" r:id="rId4">
             <p14:nvContentPartPr>
               <p14:cNvPr id="5" name="Entrada de lápiz 4">
@@ -27876,7 +28711,7 @@
             </p14:xfrm>
           </p:contentPart>
         </mc:Choice>
-        <mc:Fallback>
+        <mc:Fallback xmlns="">
           <p:pic>
             <p:nvPicPr>
               <p:cNvPr id="5" name="Entrada de lápiz 4">
@@ -31481,8 +32316,8 @@
           </a:p>
         </p:txBody>
       </p:sp>
-      <mc:AlternateContent xmlns:mc="http://schemas.openxmlformats.org/markup-compatibility/2006">
-        <mc:Choice xmlns:p14="http://schemas.microsoft.com/office/powerpoint/2010/main" Requires="p14">
+      <mc:AlternateContent xmlns:mc="http://schemas.openxmlformats.org/markup-compatibility/2006" xmlns:p14="http://schemas.microsoft.com/office/powerpoint/2010/main">
+        <mc:Choice Requires="p14">
           <p:contentPart p14:bwMode="auto" r:id="rId4">
             <p14:nvContentPartPr>
               <p14:cNvPr id="5" name="Entrada de lápiz 4">
@@ -31501,7 +32336,7 @@
             </p14:xfrm>
           </p:contentPart>
         </mc:Choice>
-        <mc:Fallback>
+        <mc:Fallback xmlns="">
           <p:pic>
             <p:nvPicPr>
               <p:cNvPr id="5" name="Entrada de lápiz 4">
@@ -32840,6 +33675,15 @@
 </file>
 
 <file path=customXml/item1.xml><?xml version="1.0" encoding="utf-8"?>
+<p:properties xmlns:p="http://schemas.microsoft.com/office/2006/metadata/properties" xmlns:xsi="http://www.w3.org/2001/XMLSchema-instance" xmlns:pc="http://schemas.microsoft.com/office/infopath/2007/PartnerControls">
+  <documentManagement>
+    <_ip_UnifiedCompliancePolicyUIAction xmlns="http://schemas.microsoft.com/sharepoint/v3" xsi:nil="true"/>
+    <_ip_UnifiedCompliancePolicyProperties xmlns="http://schemas.microsoft.com/sharepoint/v3" xsi:nil="true"/>
+  </documentManagement>
+</p:properties>
+</file>
+
+<file path=customXml/item2.xml><?xml version="1.0" encoding="utf-8"?>
 <ct:contentTypeSchema xmlns:ct="http://schemas.microsoft.com/office/2006/metadata/contentType" xmlns:ma="http://schemas.microsoft.com/office/2006/metadata/properties/metaAttributes" ct:_="" ma:_="" ma:contentTypeName="Document" ma:contentTypeID="0x010100DEEA25CC0A0AC24199CDC46C25B8B0BC" ma:contentTypeVersion="10" ma:contentTypeDescription="Create a new document." ma:contentTypeScope="" ma:versionID="e3b47856d4cf355c0dacb39e1084d14f">
   <xsd:schema xmlns:xsd="http://www.w3.org/2001/XMLSchema" xmlns:xs="http://www.w3.org/2001/XMLSchema" xmlns:p="http://schemas.microsoft.com/office/2006/metadata/properties" xmlns:ns1="http://schemas.microsoft.com/sharepoint/v3" xmlns:ns2="6dc4bcd6-49db-4c07-9060-8acfc67cef9f" xmlns:ns3="fb0879af-3eba-417a-a55a-ffe6dcd6ca77" targetNamespace="http://schemas.microsoft.com/office/2006/metadata/properties" ma:root="true" ma:fieldsID="a845a615265fdb1f7b12cc65ac20ecbd" ns1:_="" ns2:_="" ns3:_="">
     <xsd:import namespace="http://schemas.microsoft.com/sharepoint/v3"/>
@@ -33047,15 +33891,6 @@
 </ct:contentTypeSchema>
 </file>
 
-<file path=customXml/item2.xml><?xml version="1.0" encoding="utf-8"?>
-<p:properties xmlns:p="http://schemas.microsoft.com/office/2006/metadata/properties" xmlns:xsi="http://www.w3.org/2001/XMLSchema-instance" xmlns:pc="http://schemas.microsoft.com/office/infopath/2007/PartnerControls">
-  <documentManagement>
-    <_ip_UnifiedCompliancePolicyUIAction xmlns="http://schemas.microsoft.com/sharepoint/v3" xsi:nil="true"/>
-    <_ip_UnifiedCompliancePolicyProperties xmlns="http://schemas.microsoft.com/sharepoint/v3" xsi:nil="true"/>
-  </documentManagement>
-</p:properties>
-</file>
-
 <file path=customXml/item3.xml><?xml version="1.0" encoding="utf-8"?>
 <?mso-contentType ?>
 <FormTemplates xmlns="http://schemas.microsoft.com/sharepoint/v3/contenttype/forms">
@@ -33066,6 +33901,16 @@
 </file>
 
 <file path=customXml/itemProps1.xml><?xml version="1.0" encoding="utf-8"?>
+<ds:datastoreItem xmlns:ds="http://schemas.openxmlformats.org/officeDocument/2006/customXml" ds:itemID="{E4934E25-8442-49E9-ABDF-3146C4145F3B}">
+  <ds:schemaRefs>
+    <ds:schemaRef ds:uri="http://schemas.microsoft.com/office/2006/metadata/properties"/>
+    <ds:schemaRef ds:uri="http://schemas.microsoft.com/office/infopath/2007/PartnerControls"/>
+    <ds:schemaRef ds:uri="http://schemas.microsoft.com/sharepoint/v3"/>
+  </ds:schemaRefs>
+</ds:datastoreItem>
+</file>
+
+<file path=customXml/itemProps2.xml><?xml version="1.0" encoding="utf-8"?>
 <ds:datastoreItem xmlns:ds="http://schemas.openxmlformats.org/officeDocument/2006/customXml" ds:itemID="{1BBB5711-29E1-4F8E-81A0-7947C57B208A}">
   <ds:schemaRefs>
     <ds:schemaRef ds:uri="http://schemas.microsoft.com/office/2006/metadata/contentType"/>
@@ -33085,16 +33930,6 @@
 </ds:datastoreItem>
 </file>
 
-<file path=customXml/itemProps2.xml><?xml version="1.0" encoding="utf-8"?>
-<ds:datastoreItem xmlns:ds="http://schemas.openxmlformats.org/officeDocument/2006/customXml" ds:itemID="{E4934E25-8442-49E9-ABDF-3146C4145F3B}">
-  <ds:schemaRefs>
-    <ds:schemaRef ds:uri="http://schemas.microsoft.com/office/2006/metadata/properties"/>
-    <ds:schemaRef ds:uri="http://schemas.microsoft.com/office/infopath/2007/PartnerControls"/>
-    <ds:schemaRef ds:uri="http://schemas.microsoft.com/sharepoint/v3"/>
-  </ds:schemaRefs>
-</ds:datastoreItem>
-</file>
-
 <file path=customXml/itemProps3.xml><?xml version="1.0" encoding="utf-8"?>
 <ds:datastoreItem xmlns:ds="http://schemas.openxmlformats.org/officeDocument/2006/customXml" ds:itemID="{F6CB1848-D3E0-4F10-B640-720BE758B85B}">
   <ds:schemaRefs>

</xml_diff>